<commit_message>
added the slide why we should choose a public cloud extension
</commit_message>
<xml_diff>
--- a/Azurefunction 2.0.pptx
+++ b/Azurefunction 2.0.pptx
@@ -14,26 +14,27 @@
     <p:sldId id="281" r:id="rId8"/>
     <p:sldId id="256" r:id="rId9"/>
     <p:sldId id="263" r:id="rId10"/>
-    <p:sldId id="284" r:id="rId11"/>
-    <p:sldId id="266" r:id="rId12"/>
-    <p:sldId id="264" r:id="rId13"/>
-    <p:sldId id="265" r:id="rId14"/>
-    <p:sldId id="267" r:id="rId15"/>
-    <p:sldId id="286" r:id="rId16"/>
-    <p:sldId id="268" r:id="rId17"/>
-    <p:sldId id="269" r:id="rId18"/>
-    <p:sldId id="270" r:id="rId19"/>
-    <p:sldId id="279" r:id="rId20"/>
-    <p:sldId id="285" r:id="rId21"/>
-    <p:sldId id="271" r:id="rId22"/>
-    <p:sldId id="272" r:id="rId23"/>
-    <p:sldId id="273" r:id="rId24"/>
-    <p:sldId id="274" r:id="rId25"/>
-    <p:sldId id="275" r:id="rId26"/>
-    <p:sldId id="276" r:id="rId27"/>
-    <p:sldId id="277" r:id="rId28"/>
-    <p:sldId id="278" r:id="rId29"/>
-    <p:sldId id="282" r:id="rId30"/>
+    <p:sldId id="287" r:id="rId11"/>
+    <p:sldId id="284" r:id="rId12"/>
+    <p:sldId id="266" r:id="rId13"/>
+    <p:sldId id="264" r:id="rId14"/>
+    <p:sldId id="265" r:id="rId15"/>
+    <p:sldId id="267" r:id="rId16"/>
+    <p:sldId id="286" r:id="rId17"/>
+    <p:sldId id="268" r:id="rId18"/>
+    <p:sldId id="269" r:id="rId19"/>
+    <p:sldId id="270" r:id="rId20"/>
+    <p:sldId id="279" r:id="rId21"/>
+    <p:sldId id="285" r:id="rId22"/>
+    <p:sldId id="271" r:id="rId23"/>
+    <p:sldId id="272" r:id="rId24"/>
+    <p:sldId id="273" r:id="rId25"/>
+    <p:sldId id="274" r:id="rId26"/>
+    <p:sldId id="275" r:id="rId27"/>
+    <p:sldId id="276" r:id="rId28"/>
+    <p:sldId id="277" r:id="rId29"/>
+    <p:sldId id="278" r:id="rId30"/>
+    <p:sldId id="282" r:id="rId31"/>
   </p:sldIdLst>
   <p:sldSz cx="9144000" cy="5143500" type="screen16x9"/>
   <p:notesSz cx="6858000" cy="9144000"/>
@@ -42031,6 +42032,1222 @@
           <p:cNvPr id="2" name="Title 1">
             <a:extLst>
               <a:ext uri="{FF2B5EF4-FFF2-40B4-BE49-F238E27FC236}">
+                <a16:creationId xmlns:a16="http://schemas.microsoft.com/office/drawing/2014/main" id="{E7A8E171-8182-4B83-A134-D8CA3A34DDB2}"/>
+              </a:ext>
+            </a:extLst>
+          </p:cNvPr>
+          <p:cNvSpPr>
+            <a:spLocks noGrp="1"/>
+          </p:cNvSpPr>
+          <p:nvPr>
+            <p:ph type="title"/>
+          </p:nvPr>
+        </p:nvSpPr>
+        <p:spPr/>
+        <p:txBody>
+          <a:bodyPr/>
+          <a:lstStyle/>
+          <a:p>
+            <a:r>
+              <a:rPr lang="en-US" dirty="0"/>
+              <a:t>Azure function 2.0 Architecture</a:t>
+            </a:r>
+          </a:p>
+        </p:txBody>
+      </p:sp>
+      <p:sp>
+        <p:nvSpPr>
+          <p:cNvPr id="4" name="Flowchart: Magnetic Disk 3">
+            <a:extLst>
+              <a:ext uri="{FF2B5EF4-FFF2-40B4-BE49-F238E27FC236}">
+                <a16:creationId xmlns:a16="http://schemas.microsoft.com/office/drawing/2014/main" id="{4AABCAF4-5610-4276-BC62-0156F6A7C980}"/>
+              </a:ext>
+            </a:extLst>
+          </p:cNvPr>
+          <p:cNvSpPr/>
+          <p:nvPr/>
+        </p:nvSpPr>
+        <p:spPr>
+          <a:xfrm>
+            <a:off x="1134679" y="697202"/>
+            <a:ext cx="6905734" cy="3452197"/>
+          </a:xfrm>
+          <a:prstGeom prst="flowChartMagneticDisk">
+            <a:avLst/>
+          </a:prstGeom>
+          <a:solidFill>
+            <a:schemeClr val="tx1"/>
+          </a:solidFill>
+          <a:ln>
+            <a:noFill/>
+          </a:ln>
+          <a:effectLst/>
+        </p:spPr>
+        <p:style>
+          <a:lnRef idx="1">
+            <a:schemeClr val="accent1"/>
+          </a:lnRef>
+          <a:fillRef idx="3">
+            <a:schemeClr val="accent1"/>
+          </a:fillRef>
+          <a:effectRef idx="2">
+            <a:schemeClr val="accent1"/>
+          </a:effectRef>
+          <a:fontRef idx="minor">
+            <a:schemeClr val="lt1"/>
+          </a:fontRef>
+        </p:style>
+        <p:txBody>
+          <a:bodyPr rtlCol="0" anchor="ctr"/>
+          <a:lstStyle/>
+          <a:p>
+            <a:pPr algn="ctr"/>
+            <a:endParaRPr lang="en-US"/>
+          </a:p>
+        </p:txBody>
+      </p:sp>
+      <p:sp>
+        <p:nvSpPr>
+          <p:cNvPr id="6" name="Flowchart: Alternate Process 5">
+            <a:extLst>
+              <a:ext uri="{FF2B5EF4-FFF2-40B4-BE49-F238E27FC236}">
+                <a16:creationId xmlns:a16="http://schemas.microsoft.com/office/drawing/2014/main" id="{B9572589-2E6F-4833-8C66-3C5E568184E4}"/>
+              </a:ext>
+            </a:extLst>
+          </p:cNvPr>
+          <p:cNvSpPr/>
+          <p:nvPr/>
+        </p:nvSpPr>
+        <p:spPr>
+          <a:xfrm>
+            <a:off x="1352369" y="3720671"/>
+            <a:ext cx="6488354" cy="336332"/>
+          </a:xfrm>
+          <a:prstGeom prst="flowChartAlternateProcess">
+            <a:avLst/>
+          </a:prstGeom>
+          <a:solidFill>
+            <a:schemeClr val="tx2">
+              <a:lumMod val="90000"/>
+              <a:lumOff val="10000"/>
+            </a:schemeClr>
+          </a:solidFill>
+          <a:ln>
+            <a:solidFill>
+              <a:schemeClr val="bg1"/>
+            </a:solidFill>
+          </a:ln>
+          <a:effectLst/>
+        </p:spPr>
+        <p:style>
+          <a:lnRef idx="1">
+            <a:schemeClr val="accent1"/>
+          </a:lnRef>
+          <a:fillRef idx="3">
+            <a:schemeClr val="accent1"/>
+          </a:fillRef>
+          <a:effectRef idx="2">
+            <a:schemeClr val="accent1"/>
+          </a:effectRef>
+          <a:fontRef idx="minor">
+            <a:schemeClr val="lt1"/>
+          </a:fontRef>
+        </p:style>
+        <p:txBody>
+          <a:bodyPr rtlCol="0" anchor="ctr"/>
+          <a:lstStyle/>
+          <a:p>
+            <a:pPr algn="ctr"/>
+            <a:r>
+              <a:rPr lang="en-US" dirty="0"/>
+              <a:t>Functions v2 runtime</a:t>
+            </a:r>
+          </a:p>
+        </p:txBody>
+      </p:sp>
+      <p:sp>
+        <p:nvSpPr>
+          <p:cNvPr id="7" name="Flowchart: Alternate Process 6">
+            <a:extLst>
+              <a:ext uri="{FF2B5EF4-FFF2-40B4-BE49-F238E27FC236}">
+                <a16:creationId xmlns:a16="http://schemas.microsoft.com/office/drawing/2014/main" id="{71D5F982-18DB-43A5-A771-DD84600F4E65}"/>
+              </a:ext>
+            </a:extLst>
+          </p:cNvPr>
+          <p:cNvSpPr/>
+          <p:nvPr/>
+        </p:nvSpPr>
+        <p:spPr>
+          <a:xfrm>
+            <a:off x="1152419" y="2634606"/>
+            <a:ext cx="6779172" cy="1086065"/>
+          </a:xfrm>
+          <a:prstGeom prst="flowChartAlternateProcess">
+            <a:avLst/>
+          </a:prstGeom>
+          <a:solidFill>
+            <a:schemeClr val="tx2">
+              <a:lumMod val="75000"/>
+              <a:lumOff val="25000"/>
+            </a:schemeClr>
+          </a:solidFill>
+          <a:ln>
+            <a:solidFill>
+              <a:schemeClr val="bg1"/>
+            </a:solidFill>
+          </a:ln>
+          <a:effectLst/>
+        </p:spPr>
+        <p:style>
+          <a:lnRef idx="1">
+            <a:schemeClr val="accent1"/>
+          </a:lnRef>
+          <a:fillRef idx="3">
+            <a:schemeClr val="accent1"/>
+          </a:fillRef>
+          <a:effectRef idx="2">
+            <a:schemeClr val="accent1"/>
+          </a:effectRef>
+          <a:fontRef idx="minor">
+            <a:schemeClr val="lt1"/>
+          </a:fontRef>
+        </p:style>
+        <p:txBody>
+          <a:bodyPr rtlCol="0" anchor="ctr"/>
+          <a:lstStyle/>
+          <a:p>
+            <a:pPr lvl="8" algn="r"/>
+            <a:endParaRPr lang="en-US" dirty="0"/>
+          </a:p>
+          <a:p>
+            <a:pPr lvl="8" algn="r"/>
+            <a:endParaRPr lang="en-US" dirty="0"/>
+          </a:p>
+          <a:p>
+            <a:pPr lvl="8" algn="r"/>
+            <a:endParaRPr lang="en-US" dirty="0"/>
+          </a:p>
+          <a:p>
+            <a:pPr lvl="8" algn="r"/>
+            <a:r>
+              <a:rPr lang="en-US" dirty="0"/>
+              <a:t>Host process</a:t>
+            </a:r>
+          </a:p>
+        </p:txBody>
+      </p:sp>
+      <p:sp>
+        <p:nvSpPr>
+          <p:cNvPr id="8" name="Flowchart: Alternate Process 7">
+            <a:extLst>
+              <a:ext uri="{FF2B5EF4-FFF2-40B4-BE49-F238E27FC236}">
+                <a16:creationId xmlns:a16="http://schemas.microsoft.com/office/drawing/2014/main" id="{BFEF1D9A-AC40-4988-8D30-B91BA710A316}"/>
+              </a:ext>
+            </a:extLst>
+          </p:cNvPr>
+          <p:cNvSpPr/>
+          <p:nvPr/>
+        </p:nvSpPr>
+        <p:spPr>
+          <a:xfrm>
+            <a:off x="1429411" y="2848312"/>
+            <a:ext cx="6411311" cy="609600"/>
+          </a:xfrm>
+          <a:prstGeom prst="flowChartAlternateProcess">
+            <a:avLst/>
+          </a:prstGeom>
+          <a:solidFill>
+            <a:schemeClr val="tx2">
+              <a:lumMod val="50000"/>
+              <a:lumOff val="50000"/>
+            </a:schemeClr>
+          </a:solidFill>
+          <a:ln>
+            <a:noFill/>
+          </a:ln>
+          <a:effectLst/>
+        </p:spPr>
+        <p:style>
+          <a:lnRef idx="1">
+            <a:schemeClr val="accent1"/>
+          </a:lnRef>
+          <a:fillRef idx="3">
+            <a:schemeClr val="accent1"/>
+          </a:fillRef>
+          <a:effectRef idx="2">
+            <a:schemeClr val="accent1"/>
+          </a:effectRef>
+          <a:fontRef idx="minor">
+            <a:schemeClr val="lt1"/>
+          </a:fontRef>
+        </p:style>
+        <p:txBody>
+          <a:bodyPr rtlCol="0" anchor="ctr"/>
+          <a:lstStyle/>
+          <a:p>
+            <a:pPr algn="r"/>
+            <a:r>
+              <a:rPr lang="en-US" dirty="0"/>
+              <a:t> Host Runtime</a:t>
+            </a:r>
+          </a:p>
+        </p:txBody>
+      </p:sp>
+      <p:sp>
+        <p:nvSpPr>
+          <p:cNvPr id="9" name="Flowchart: Alternate Process 8">
+            <a:extLst>
+              <a:ext uri="{FF2B5EF4-FFF2-40B4-BE49-F238E27FC236}">
+                <a16:creationId xmlns:a16="http://schemas.microsoft.com/office/drawing/2014/main" id="{DB641EE8-C356-4C87-8E58-F42A88EAF273}"/>
+              </a:ext>
+            </a:extLst>
+          </p:cNvPr>
+          <p:cNvSpPr/>
+          <p:nvPr/>
+        </p:nvSpPr>
+        <p:spPr>
+          <a:xfrm>
+            <a:off x="1576556" y="2895258"/>
+            <a:ext cx="1313793" cy="562654"/>
+          </a:xfrm>
+          <a:prstGeom prst="flowChartAlternateProcess">
+            <a:avLst/>
+          </a:prstGeom>
+          <a:solidFill>
+            <a:schemeClr val="tx1">
+              <a:lumMod val="50000"/>
+            </a:schemeClr>
+          </a:solidFill>
+          <a:ln>
+            <a:noFill/>
+          </a:ln>
+          <a:effectLst/>
+        </p:spPr>
+        <p:style>
+          <a:lnRef idx="1">
+            <a:schemeClr val="accent1"/>
+          </a:lnRef>
+          <a:fillRef idx="3">
+            <a:schemeClr val="accent1"/>
+          </a:fillRef>
+          <a:effectRef idx="2">
+            <a:schemeClr val="accent1"/>
+          </a:effectRef>
+          <a:fontRef idx="minor">
+            <a:schemeClr val="lt1"/>
+          </a:fontRef>
+        </p:style>
+        <p:txBody>
+          <a:bodyPr rtlCol="0" anchor="ctr"/>
+          <a:lstStyle/>
+          <a:p>
+            <a:pPr algn="ctr"/>
+            <a:r>
+              <a:rPr lang="en-US" dirty="0"/>
+              <a:t>.NET </a:t>
+            </a:r>
+          </a:p>
+          <a:p>
+            <a:pPr algn="ctr"/>
+            <a:r>
+              <a:rPr lang="en-US" dirty="0"/>
+              <a:t>(v1)</a:t>
+            </a:r>
+          </a:p>
+        </p:txBody>
+      </p:sp>
+      <p:sp>
+        <p:nvSpPr>
+          <p:cNvPr id="10" name="Flowchart: Alternate Process 9">
+            <a:extLst>
+              <a:ext uri="{FF2B5EF4-FFF2-40B4-BE49-F238E27FC236}">
+                <a16:creationId xmlns:a16="http://schemas.microsoft.com/office/drawing/2014/main" id="{0A0A4433-2F8D-401B-A001-910FB85B6A57}"/>
+              </a:ext>
+            </a:extLst>
+          </p:cNvPr>
+          <p:cNvSpPr/>
+          <p:nvPr/>
+        </p:nvSpPr>
+        <p:spPr>
+          <a:xfrm>
+            <a:off x="3275945" y="2895258"/>
+            <a:ext cx="1474731" cy="515829"/>
+          </a:xfrm>
+          <a:prstGeom prst="flowChartAlternateProcess">
+            <a:avLst/>
+          </a:prstGeom>
+          <a:solidFill>
+            <a:schemeClr val="tx1">
+              <a:lumMod val="50000"/>
+            </a:schemeClr>
+          </a:solidFill>
+          <a:ln>
+            <a:noFill/>
+          </a:ln>
+          <a:effectLst/>
+        </p:spPr>
+        <p:style>
+          <a:lnRef idx="1">
+            <a:schemeClr val="accent1"/>
+          </a:lnRef>
+          <a:fillRef idx="3">
+            <a:schemeClr val="accent1"/>
+          </a:fillRef>
+          <a:effectRef idx="2">
+            <a:schemeClr val="accent1"/>
+          </a:effectRef>
+          <a:fontRef idx="minor">
+            <a:schemeClr val="lt1"/>
+          </a:fontRef>
+        </p:style>
+        <p:txBody>
+          <a:bodyPr rtlCol="0" anchor="ctr"/>
+          <a:lstStyle/>
+          <a:p>
+            <a:pPr algn="ctr"/>
+            <a:r>
+              <a:rPr lang="en-US" dirty="0"/>
+              <a:t>.NET Core</a:t>
+            </a:r>
+          </a:p>
+          <a:p>
+            <a:pPr algn="ctr"/>
+            <a:r>
+              <a:rPr lang="en-US" dirty="0"/>
+              <a:t>(V2)</a:t>
+            </a:r>
+          </a:p>
+        </p:txBody>
+      </p:sp>
+      <p:sp>
+        <p:nvSpPr>
+          <p:cNvPr id="11" name="Flowchart: Alternate Process 10">
+            <a:extLst>
+              <a:ext uri="{FF2B5EF4-FFF2-40B4-BE49-F238E27FC236}">
+                <a16:creationId xmlns:a16="http://schemas.microsoft.com/office/drawing/2014/main" id="{63C57E02-2DE0-4FA6-8FFF-219E4D050910}"/>
+              </a:ext>
+            </a:extLst>
+          </p:cNvPr>
+          <p:cNvSpPr/>
+          <p:nvPr/>
+        </p:nvSpPr>
+        <p:spPr>
+          <a:xfrm>
+            <a:off x="1152419" y="1250731"/>
+            <a:ext cx="6887994" cy="1258163"/>
+          </a:xfrm>
+          <a:prstGeom prst="flowChartAlternateProcess">
+            <a:avLst/>
+          </a:prstGeom>
+          <a:solidFill>
+            <a:schemeClr val="bg2">
+              <a:lumMod val="50000"/>
+            </a:schemeClr>
+          </a:solidFill>
+          <a:ln>
+            <a:solidFill>
+              <a:schemeClr val="bg1"/>
+            </a:solidFill>
+          </a:ln>
+          <a:effectLst/>
+        </p:spPr>
+        <p:style>
+          <a:lnRef idx="1">
+            <a:schemeClr val="accent1"/>
+          </a:lnRef>
+          <a:fillRef idx="3">
+            <a:schemeClr val="accent1"/>
+          </a:fillRef>
+          <a:effectRef idx="2">
+            <a:schemeClr val="accent1"/>
+          </a:effectRef>
+          <a:fontRef idx="minor">
+            <a:schemeClr val="lt1"/>
+          </a:fontRef>
+        </p:style>
+        <p:txBody>
+          <a:bodyPr rtlCol="0" anchor="ctr"/>
+          <a:lstStyle/>
+          <a:p>
+            <a:pPr algn="r"/>
+            <a:endParaRPr lang="en-US" dirty="0"/>
+          </a:p>
+          <a:p>
+            <a:pPr algn="r"/>
+            <a:endParaRPr lang="en-US" dirty="0"/>
+          </a:p>
+          <a:p>
+            <a:pPr algn="r"/>
+            <a:endParaRPr lang="en-US" dirty="0"/>
+          </a:p>
+          <a:p>
+            <a:pPr lvl="1" algn="r"/>
+            <a:r>
+              <a:rPr lang="en-US" dirty="0"/>
+              <a:t>	  Language Worker</a:t>
+            </a:r>
+          </a:p>
+        </p:txBody>
+      </p:sp>
+      <p:sp>
+        <p:nvSpPr>
+          <p:cNvPr id="12" name="Flowchart: Alternate Process 11">
+            <a:extLst>
+              <a:ext uri="{FF2B5EF4-FFF2-40B4-BE49-F238E27FC236}">
+                <a16:creationId xmlns:a16="http://schemas.microsoft.com/office/drawing/2014/main" id="{CFFE734D-19B3-4BCA-8317-D280770A3965}"/>
+              </a:ext>
+            </a:extLst>
+          </p:cNvPr>
+          <p:cNvSpPr/>
+          <p:nvPr/>
+        </p:nvSpPr>
+        <p:spPr>
+          <a:xfrm>
+            <a:off x="1229708" y="1359768"/>
+            <a:ext cx="6701883" cy="759841"/>
+          </a:xfrm>
+          <a:prstGeom prst="flowChartAlternateProcess">
+            <a:avLst/>
+          </a:prstGeom>
+          <a:solidFill>
+            <a:schemeClr val="bg2">
+              <a:lumMod val="65000"/>
+            </a:schemeClr>
+          </a:solidFill>
+          <a:ln>
+            <a:solidFill>
+              <a:schemeClr val="accent2">
+                <a:lumMod val="50000"/>
+              </a:schemeClr>
+            </a:solidFill>
+          </a:ln>
+          <a:effectLst/>
+        </p:spPr>
+        <p:style>
+          <a:lnRef idx="1">
+            <a:schemeClr val="accent1"/>
+          </a:lnRef>
+          <a:fillRef idx="3">
+            <a:schemeClr val="accent1"/>
+          </a:fillRef>
+          <a:effectRef idx="2">
+            <a:schemeClr val="accent1"/>
+          </a:effectRef>
+          <a:fontRef idx="minor">
+            <a:schemeClr val="lt1"/>
+          </a:fontRef>
+        </p:style>
+        <p:txBody>
+          <a:bodyPr rtlCol="0" anchor="ctr"/>
+          <a:lstStyle/>
+          <a:p>
+            <a:pPr lvl="8" algn="ctr"/>
+            <a:endParaRPr lang="en-US" dirty="0"/>
+          </a:p>
+          <a:p>
+            <a:pPr lvl="8" algn="ctr"/>
+            <a:r>
+              <a:rPr lang="en-US" dirty="0"/>
+              <a:t>	              Function code</a:t>
+            </a:r>
+          </a:p>
+        </p:txBody>
+      </p:sp>
+      <p:sp>
+        <p:nvSpPr>
+          <p:cNvPr id="16" name="Flowchart: Alternate Process 15">
+            <a:extLst>
+              <a:ext uri="{FF2B5EF4-FFF2-40B4-BE49-F238E27FC236}">
+                <a16:creationId xmlns:a16="http://schemas.microsoft.com/office/drawing/2014/main" id="{92380E7F-DE68-4623-AEA9-4C8ACAB8E48E}"/>
+              </a:ext>
+            </a:extLst>
+          </p:cNvPr>
+          <p:cNvSpPr/>
+          <p:nvPr/>
+        </p:nvSpPr>
+        <p:spPr>
+          <a:xfrm>
+            <a:off x="4894219" y="1392847"/>
+            <a:ext cx="1359444" cy="346842"/>
+          </a:xfrm>
+          <a:prstGeom prst="flowChartAlternateProcess">
+            <a:avLst/>
+          </a:prstGeom>
+          <a:solidFill>
+            <a:schemeClr val="accent4">
+              <a:lumMod val="50000"/>
+            </a:schemeClr>
+          </a:solidFill>
+          <a:ln>
+            <a:noFill/>
+          </a:ln>
+          <a:effectLst/>
+        </p:spPr>
+        <p:style>
+          <a:lnRef idx="1">
+            <a:schemeClr val="accent1"/>
+          </a:lnRef>
+          <a:fillRef idx="3">
+            <a:schemeClr val="accent1"/>
+          </a:fillRef>
+          <a:effectRef idx="2">
+            <a:schemeClr val="accent1"/>
+          </a:effectRef>
+          <a:fontRef idx="minor">
+            <a:schemeClr val="lt1"/>
+          </a:fontRef>
+        </p:style>
+        <p:txBody>
+          <a:bodyPr rtlCol="0" anchor="ctr"/>
+          <a:lstStyle/>
+          <a:p>
+            <a:pPr algn="ctr"/>
+            <a:r>
+              <a:rPr lang="en-US" dirty="0"/>
+              <a:t>.NET core</a:t>
+            </a:r>
+          </a:p>
+        </p:txBody>
+      </p:sp>
+      <p:sp>
+        <p:nvSpPr>
+          <p:cNvPr id="18" name="Arrow: Down 17">
+            <a:extLst>
+              <a:ext uri="{FF2B5EF4-FFF2-40B4-BE49-F238E27FC236}">
+                <a16:creationId xmlns:a16="http://schemas.microsoft.com/office/drawing/2014/main" id="{71434F70-AAE0-4E68-9B2F-E84FA98F8497}"/>
+              </a:ext>
+            </a:extLst>
+          </p:cNvPr>
+          <p:cNvSpPr/>
+          <p:nvPr/>
+        </p:nvSpPr>
+        <p:spPr>
+          <a:xfrm>
+            <a:off x="5304118" y="1739689"/>
+            <a:ext cx="497930" cy="1131841"/>
+          </a:xfrm>
+          <a:prstGeom prst="downArrow">
+            <a:avLst/>
+          </a:prstGeom>
+          <a:solidFill>
+            <a:schemeClr val="accent3">
+              <a:lumMod val="50000"/>
+            </a:schemeClr>
+          </a:solidFill>
+          <a:ln>
+            <a:noFill/>
+          </a:ln>
+          <a:effectLst/>
+        </p:spPr>
+        <p:style>
+          <a:lnRef idx="1">
+            <a:schemeClr val="accent1"/>
+          </a:lnRef>
+          <a:fillRef idx="3">
+            <a:schemeClr val="accent1"/>
+          </a:fillRef>
+          <a:effectRef idx="2">
+            <a:schemeClr val="accent1"/>
+          </a:effectRef>
+          <a:fontRef idx="minor">
+            <a:schemeClr val="lt1"/>
+          </a:fontRef>
+        </p:style>
+        <p:txBody>
+          <a:bodyPr rot="0" spcFirstLastPara="0" vertOverflow="overflow" horzOverflow="overflow" vert="horz" wrap="square" lIns="91440" tIns="45720" rIns="91440" bIns="45720" numCol="1" spcCol="0" rtlCol="0" fromWordArt="0" anchor="ctr" anchorCtr="0" forceAA="0" compatLnSpc="1">
+            <a:prstTxWarp prst="textNoShape">
+              <a:avLst/>
+            </a:prstTxWarp>
+            <a:noAutofit/>
+          </a:bodyPr>
+          <a:lstStyle/>
+          <a:p>
+            <a:pPr algn="ctr"/>
+            <a:endParaRPr lang="en-US"/>
+          </a:p>
+        </p:txBody>
+      </p:sp>
+      <p:sp>
+        <p:nvSpPr>
+          <p:cNvPr id="19" name="Arrow: Down 18">
+            <a:extLst>
+              <a:ext uri="{FF2B5EF4-FFF2-40B4-BE49-F238E27FC236}">
+                <a16:creationId xmlns:a16="http://schemas.microsoft.com/office/drawing/2014/main" id="{6AD35324-9637-4695-B0BC-8256C82378D6}"/>
+              </a:ext>
+            </a:extLst>
+          </p:cNvPr>
+          <p:cNvSpPr/>
+          <p:nvPr/>
+        </p:nvSpPr>
+        <p:spPr>
+          <a:xfrm>
+            <a:off x="2897363" y="1751750"/>
+            <a:ext cx="497930" cy="1119780"/>
+          </a:xfrm>
+          <a:prstGeom prst="downArrow">
+            <a:avLst/>
+          </a:prstGeom>
+          <a:solidFill>
+            <a:schemeClr val="accent3">
+              <a:lumMod val="50000"/>
+            </a:schemeClr>
+          </a:solidFill>
+          <a:ln>
+            <a:noFill/>
+          </a:ln>
+          <a:effectLst/>
+        </p:spPr>
+        <p:style>
+          <a:lnRef idx="1">
+            <a:schemeClr val="accent1"/>
+          </a:lnRef>
+          <a:fillRef idx="3">
+            <a:schemeClr val="accent1"/>
+          </a:fillRef>
+          <a:effectRef idx="2">
+            <a:schemeClr val="accent1"/>
+          </a:effectRef>
+          <a:fontRef idx="minor">
+            <a:schemeClr val="lt1"/>
+          </a:fontRef>
+        </p:style>
+        <p:txBody>
+          <a:bodyPr rot="0" spcFirstLastPara="0" vertOverflow="overflow" horzOverflow="overflow" vert="horz" wrap="square" lIns="91440" tIns="45720" rIns="91440" bIns="45720" numCol="1" spcCol="0" rtlCol="0" fromWordArt="0" anchor="ctr" anchorCtr="0" forceAA="0" compatLnSpc="1">
+            <a:prstTxWarp prst="textNoShape">
+              <a:avLst/>
+            </a:prstTxWarp>
+            <a:noAutofit/>
+          </a:bodyPr>
+          <a:lstStyle/>
+          <a:p>
+            <a:pPr algn="ctr"/>
+            <a:endParaRPr lang="en-US"/>
+          </a:p>
+        </p:txBody>
+      </p:sp>
+      <p:sp>
+        <p:nvSpPr>
+          <p:cNvPr id="20" name="Arrow: Down 19">
+            <a:extLst>
+              <a:ext uri="{FF2B5EF4-FFF2-40B4-BE49-F238E27FC236}">
+                <a16:creationId xmlns:a16="http://schemas.microsoft.com/office/drawing/2014/main" id="{11D12455-AD5C-4445-BDEA-F806B4656CCE}"/>
+              </a:ext>
+            </a:extLst>
+          </p:cNvPr>
+          <p:cNvSpPr/>
+          <p:nvPr/>
+        </p:nvSpPr>
+        <p:spPr>
+          <a:xfrm>
+            <a:off x="4089616" y="1739689"/>
+            <a:ext cx="497930" cy="1092857"/>
+          </a:xfrm>
+          <a:prstGeom prst="downArrow">
+            <a:avLst/>
+          </a:prstGeom>
+          <a:solidFill>
+            <a:schemeClr val="accent3">
+              <a:lumMod val="50000"/>
+            </a:schemeClr>
+          </a:solidFill>
+          <a:ln>
+            <a:noFill/>
+          </a:ln>
+          <a:effectLst/>
+        </p:spPr>
+        <p:style>
+          <a:lnRef idx="1">
+            <a:schemeClr val="accent1"/>
+          </a:lnRef>
+          <a:fillRef idx="3">
+            <a:schemeClr val="accent1"/>
+          </a:fillRef>
+          <a:effectRef idx="2">
+            <a:schemeClr val="accent1"/>
+          </a:effectRef>
+          <a:fontRef idx="minor">
+            <a:schemeClr val="lt1"/>
+          </a:fontRef>
+        </p:style>
+        <p:txBody>
+          <a:bodyPr rot="0" spcFirstLastPara="0" vertOverflow="overflow" horzOverflow="overflow" vert="horz" wrap="square" lIns="91440" tIns="45720" rIns="91440" bIns="45720" numCol="1" spcCol="0" rtlCol="0" fromWordArt="0" anchor="ctr" anchorCtr="0" forceAA="0" compatLnSpc="1">
+            <a:prstTxWarp prst="textNoShape">
+              <a:avLst/>
+            </a:prstTxWarp>
+            <a:noAutofit/>
+          </a:bodyPr>
+          <a:lstStyle/>
+          <a:p>
+            <a:pPr algn="ctr"/>
+            <a:endParaRPr lang="en-US"/>
+          </a:p>
+        </p:txBody>
+      </p:sp>
+      <p:sp>
+        <p:nvSpPr>
+          <p:cNvPr id="21" name="Arrow: Down 20">
+            <a:extLst>
+              <a:ext uri="{FF2B5EF4-FFF2-40B4-BE49-F238E27FC236}">
+                <a16:creationId xmlns:a16="http://schemas.microsoft.com/office/drawing/2014/main" id="{D38386CF-E9DF-49A6-A4C3-D60EE62BFD13}"/>
+              </a:ext>
+            </a:extLst>
+          </p:cNvPr>
+          <p:cNvSpPr/>
+          <p:nvPr/>
+        </p:nvSpPr>
+        <p:spPr>
+          <a:xfrm>
+            <a:off x="1688450" y="1754706"/>
+            <a:ext cx="497930" cy="1074003"/>
+          </a:xfrm>
+          <a:prstGeom prst="downArrow">
+            <a:avLst/>
+          </a:prstGeom>
+          <a:solidFill>
+            <a:schemeClr val="accent3">
+              <a:lumMod val="50000"/>
+            </a:schemeClr>
+          </a:solidFill>
+          <a:ln>
+            <a:noFill/>
+          </a:ln>
+          <a:effectLst/>
+        </p:spPr>
+        <p:style>
+          <a:lnRef idx="1">
+            <a:schemeClr val="accent1"/>
+          </a:lnRef>
+          <a:fillRef idx="3">
+            <a:schemeClr val="accent1"/>
+          </a:fillRef>
+          <a:effectRef idx="2">
+            <a:schemeClr val="accent1"/>
+          </a:effectRef>
+          <a:fontRef idx="minor">
+            <a:schemeClr val="lt1"/>
+          </a:fontRef>
+        </p:style>
+        <p:txBody>
+          <a:bodyPr rtlCol="0" anchor="ctr"/>
+          <a:lstStyle/>
+          <a:p>
+            <a:pPr algn="ctr"/>
+            <a:endParaRPr lang="en-US"/>
+          </a:p>
+        </p:txBody>
+      </p:sp>
+      <p:sp>
+        <p:nvSpPr>
+          <p:cNvPr id="22" name="Flowchart: Alternate Process 21">
+            <a:extLst>
+              <a:ext uri="{FF2B5EF4-FFF2-40B4-BE49-F238E27FC236}">
+                <a16:creationId xmlns:a16="http://schemas.microsoft.com/office/drawing/2014/main" id="{BDFA0441-02F7-46B6-8FF5-78AB628A95F8}"/>
+              </a:ext>
+            </a:extLst>
+          </p:cNvPr>
+          <p:cNvSpPr/>
+          <p:nvPr/>
+        </p:nvSpPr>
+        <p:spPr>
+          <a:xfrm>
+            <a:off x="1357819" y="1392847"/>
+            <a:ext cx="1072054" cy="346842"/>
+          </a:xfrm>
+          <a:prstGeom prst="flowChartAlternateProcess">
+            <a:avLst/>
+          </a:prstGeom>
+          <a:solidFill>
+            <a:schemeClr val="accent4">
+              <a:lumMod val="50000"/>
+            </a:schemeClr>
+          </a:solidFill>
+          <a:ln>
+            <a:noFill/>
+          </a:ln>
+          <a:effectLst/>
+        </p:spPr>
+        <p:style>
+          <a:lnRef idx="1">
+            <a:schemeClr val="accent1"/>
+          </a:lnRef>
+          <a:fillRef idx="3">
+            <a:schemeClr val="accent1"/>
+          </a:fillRef>
+          <a:effectRef idx="2">
+            <a:schemeClr val="accent1"/>
+          </a:effectRef>
+          <a:fontRef idx="minor">
+            <a:schemeClr val="lt1"/>
+          </a:fontRef>
+        </p:style>
+        <p:txBody>
+          <a:bodyPr rtlCol="0" anchor="ctr"/>
+          <a:lstStyle/>
+          <a:p>
+            <a:pPr algn="ctr"/>
+            <a:r>
+              <a:rPr lang="en-US" dirty="0"/>
+              <a:t>Node. </a:t>
+            </a:r>
+            <a:r>
+              <a:rPr lang="en-US" dirty="0" err="1"/>
+              <a:t>js</a:t>
+            </a:r>
+            <a:endParaRPr lang="en-US" dirty="0"/>
+          </a:p>
+        </p:txBody>
+      </p:sp>
+      <p:sp>
+        <p:nvSpPr>
+          <p:cNvPr id="23" name="Flowchart: Alternate Process 22">
+            <a:extLst>
+              <a:ext uri="{FF2B5EF4-FFF2-40B4-BE49-F238E27FC236}">
+                <a16:creationId xmlns:a16="http://schemas.microsoft.com/office/drawing/2014/main" id="{74CC53E7-8DF7-4F3E-B896-2AC2F70DB939}"/>
+              </a:ext>
+            </a:extLst>
+          </p:cNvPr>
+          <p:cNvSpPr/>
+          <p:nvPr/>
+        </p:nvSpPr>
+        <p:spPr>
+          <a:xfrm>
+            <a:off x="2553865" y="1404909"/>
+            <a:ext cx="1072054" cy="346842"/>
+          </a:xfrm>
+          <a:prstGeom prst="flowChartAlternateProcess">
+            <a:avLst/>
+          </a:prstGeom>
+          <a:solidFill>
+            <a:schemeClr val="accent4">
+              <a:lumMod val="50000"/>
+            </a:schemeClr>
+          </a:solidFill>
+          <a:ln>
+            <a:noFill/>
+          </a:ln>
+          <a:effectLst/>
+        </p:spPr>
+        <p:style>
+          <a:lnRef idx="1">
+            <a:schemeClr val="accent1"/>
+          </a:lnRef>
+          <a:fillRef idx="3">
+            <a:schemeClr val="accent1"/>
+          </a:fillRef>
+          <a:effectRef idx="2">
+            <a:schemeClr val="accent1"/>
+          </a:effectRef>
+          <a:fontRef idx="minor">
+            <a:schemeClr val="lt1"/>
+          </a:fontRef>
+        </p:style>
+        <p:txBody>
+          <a:bodyPr rtlCol="0" anchor="ctr"/>
+          <a:lstStyle/>
+          <a:p>
+            <a:pPr algn="ctr"/>
+            <a:r>
+              <a:rPr lang="en-US" dirty="0"/>
+              <a:t>Java</a:t>
+            </a:r>
+          </a:p>
+        </p:txBody>
+      </p:sp>
+      <p:sp>
+        <p:nvSpPr>
+          <p:cNvPr id="24" name="Flowchart: Alternate Process 23">
+            <a:extLst>
+              <a:ext uri="{FF2B5EF4-FFF2-40B4-BE49-F238E27FC236}">
+                <a16:creationId xmlns:a16="http://schemas.microsoft.com/office/drawing/2014/main" id="{B22A28AB-4891-4655-9B85-BC0247D9DE71}"/>
+              </a:ext>
+            </a:extLst>
+          </p:cNvPr>
+          <p:cNvSpPr/>
+          <p:nvPr/>
+        </p:nvSpPr>
+        <p:spPr>
+          <a:xfrm>
+            <a:off x="3756476" y="1392847"/>
+            <a:ext cx="1072054" cy="346842"/>
+          </a:xfrm>
+          <a:prstGeom prst="flowChartAlternateProcess">
+            <a:avLst/>
+          </a:prstGeom>
+          <a:solidFill>
+            <a:schemeClr val="accent4">
+              <a:lumMod val="50000"/>
+            </a:schemeClr>
+          </a:solidFill>
+          <a:ln>
+            <a:noFill/>
+          </a:ln>
+          <a:effectLst/>
+        </p:spPr>
+        <p:style>
+          <a:lnRef idx="1">
+            <a:schemeClr val="accent1"/>
+          </a:lnRef>
+          <a:fillRef idx="3">
+            <a:schemeClr val="accent1"/>
+          </a:fillRef>
+          <a:effectRef idx="2">
+            <a:schemeClr val="accent1"/>
+          </a:effectRef>
+          <a:fontRef idx="minor">
+            <a:schemeClr val="lt1"/>
+          </a:fontRef>
+        </p:style>
+        <p:txBody>
+          <a:bodyPr rtlCol="0" anchor="ctr"/>
+          <a:lstStyle/>
+          <a:p>
+            <a:pPr algn="ctr"/>
+            <a:r>
+              <a:rPr lang="en-US" dirty="0"/>
+              <a:t>Python</a:t>
+            </a:r>
+          </a:p>
+        </p:txBody>
+      </p:sp>
+      <p:pic>
+        <p:nvPicPr>
+          <p:cNvPr id="35" name="Picture 34">
+            <a:extLst>
+              <a:ext uri="{FF2B5EF4-FFF2-40B4-BE49-F238E27FC236}">
+                <a16:creationId xmlns:a16="http://schemas.microsoft.com/office/drawing/2014/main" id="{C533E835-8253-427A-A099-0CC60765E004}"/>
+              </a:ext>
+            </a:extLst>
+          </p:cNvPr>
+          <p:cNvPicPr>
+            <a:picLocks noChangeAspect="1"/>
+          </p:cNvPicPr>
+          <p:nvPr/>
+        </p:nvPicPr>
+        <p:blipFill>
+          <a:blip r:embed="rId2">
+            <a:extLst>
+              <a:ext uri="{28A0092B-C50C-407E-A947-70E740481C1C}">
+                <a14:useLocalDpi xmlns:a14="http://schemas.microsoft.com/office/drawing/2010/main" val="0"/>
+              </a:ext>
+            </a:extLst>
+          </a:blip>
+          <a:stretch>
+            <a:fillRect/>
+          </a:stretch>
+        </p:blipFill>
+        <p:spPr>
+          <a:xfrm>
+            <a:off x="4600891" y="3985142"/>
+            <a:ext cx="1740428" cy="755925"/>
+          </a:xfrm>
+          <a:prstGeom prst="rect">
+            <a:avLst/>
+          </a:prstGeom>
+        </p:spPr>
+      </p:pic>
+      <p:pic>
+        <p:nvPicPr>
+          <p:cNvPr id="39" name="Picture 38" descr="A close up of a logo&#10;&#10;Description automatically generated">
+            <a:extLst>
+              <a:ext uri="{FF2B5EF4-FFF2-40B4-BE49-F238E27FC236}">
+                <a16:creationId xmlns:a16="http://schemas.microsoft.com/office/drawing/2014/main" id="{B77D1F60-CD89-4E93-B125-CEEB6ADD57A6}"/>
+              </a:ext>
+            </a:extLst>
+          </p:cNvPr>
+          <p:cNvPicPr>
+            <a:picLocks noChangeAspect="1"/>
+          </p:cNvPicPr>
+          <p:nvPr/>
+        </p:nvPicPr>
+        <p:blipFill>
+          <a:blip r:embed="rId3">
+            <a:extLst>
+              <a:ext uri="{28A0092B-C50C-407E-A947-70E740481C1C}">
+                <a14:useLocalDpi xmlns:a14="http://schemas.microsoft.com/office/drawing/2010/main" val="0"/>
+              </a:ext>
+            </a:extLst>
+          </a:blip>
+          <a:stretch>
+            <a:fillRect/>
+          </a:stretch>
+        </p:blipFill>
+        <p:spPr>
+          <a:xfrm>
+            <a:off x="6432187" y="4030255"/>
+            <a:ext cx="1359444" cy="709100"/>
+          </a:xfrm>
+          <a:prstGeom prst="rect">
+            <a:avLst/>
+          </a:prstGeom>
+        </p:spPr>
+      </p:pic>
+      <p:sp>
+        <p:nvSpPr>
+          <p:cNvPr id="40" name="Flowchart: Alternate Process 39">
+            <a:extLst>
+              <a:ext uri="{FF2B5EF4-FFF2-40B4-BE49-F238E27FC236}">
+                <a16:creationId xmlns:a16="http://schemas.microsoft.com/office/drawing/2014/main" id="{C021FB63-330E-4380-BB7E-8871818BCA87}"/>
+              </a:ext>
+            </a:extLst>
+          </p:cNvPr>
+          <p:cNvSpPr/>
+          <p:nvPr/>
+        </p:nvSpPr>
+        <p:spPr>
+          <a:xfrm>
+            <a:off x="1292779" y="4123552"/>
+            <a:ext cx="1390132" cy="579376"/>
+          </a:xfrm>
+          <a:prstGeom prst="flowChartAlternateProcess">
+            <a:avLst/>
+          </a:prstGeom>
+          <a:solidFill>
+            <a:schemeClr val="bg1">
+              <a:lumMod val="85000"/>
+            </a:schemeClr>
+          </a:solidFill>
+          <a:ln>
+            <a:noFill/>
+          </a:ln>
+          <a:effectLst/>
+        </p:spPr>
+        <p:style>
+          <a:lnRef idx="1">
+            <a:schemeClr val="accent1"/>
+          </a:lnRef>
+          <a:fillRef idx="3">
+            <a:schemeClr val="accent1"/>
+          </a:fillRef>
+          <a:effectRef idx="2">
+            <a:schemeClr val="accent1"/>
+          </a:effectRef>
+          <a:fontRef idx="minor">
+            <a:schemeClr val="lt1"/>
+          </a:fontRef>
+        </p:style>
+        <p:txBody>
+          <a:bodyPr rtlCol="0" anchor="ctr"/>
+          <a:lstStyle/>
+          <a:p>
+            <a:pPr algn="ctr"/>
+            <a:r>
+              <a:rPr lang="en-US" dirty="0">
+                <a:solidFill>
+                  <a:schemeClr val="tx2"/>
+                </a:solidFill>
+              </a:rPr>
+              <a:t>MAC</a:t>
+            </a:r>
+          </a:p>
+        </p:txBody>
+      </p:sp>
+      <p:pic>
+        <p:nvPicPr>
+          <p:cNvPr id="5" name="Picture 4">
+            <a:extLst>
+              <a:ext uri="{FF2B5EF4-FFF2-40B4-BE49-F238E27FC236}">
+                <a16:creationId xmlns:a16="http://schemas.microsoft.com/office/drawing/2014/main" id="{287A9EDA-2F5E-4792-851A-7BF4F358E74A}"/>
+              </a:ext>
+            </a:extLst>
+          </p:cNvPr>
+          <p:cNvPicPr>
+            <a:picLocks noChangeAspect="1"/>
+          </p:cNvPicPr>
+          <p:nvPr/>
+        </p:nvPicPr>
+        <p:blipFill>
+          <a:blip r:embed="rId4" cstate="print">
+            <a:extLst>
+              <a:ext uri="{28A0092B-C50C-407E-A947-70E740481C1C}">
+                <a14:useLocalDpi xmlns:a14="http://schemas.microsoft.com/office/drawing/2010/main" val="0"/>
+              </a:ext>
+            </a:extLst>
+          </a:blip>
+          <a:stretch>
+            <a:fillRect/>
+          </a:stretch>
+        </p:blipFill>
+        <p:spPr>
+          <a:xfrm>
+            <a:off x="2897363" y="4130413"/>
+            <a:ext cx="859113" cy="557105"/>
+          </a:xfrm>
+          <a:prstGeom prst="rect">
+            <a:avLst/>
+          </a:prstGeom>
+        </p:spPr>
+      </p:pic>
+      <p:pic>
+        <p:nvPicPr>
+          <p:cNvPr id="14" name="Picture 13">
+            <a:extLst>
+              <a:ext uri="{FF2B5EF4-FFF2-40B4-BE49-F238E27FC236}">
+                <a16:creationId xmlns:a16="http://schemas.microsoft.com/office/drawing/2014/main" id="{808FB694-649E-4F34-9EFB-A51727ECA016}"/>
+              </a:ext>
+            </a:extLst>
+          </p:cNvPr>
+          <p:cNvPicPr>
+            <a:picLocks noChangeAspect="1"/>
+          </p:cNvPicPr>
+          <p:nvPr/>
+        </p:nvPicPr>
+        <p:blipFill>
+          <a:blip r:embed="rId5">
+            <a:extLst>
+              <a:ext uri="{28A0092B-C50C-407E-A947-70E740481C1C}">
+                <a14:useLocalDpi xmlns:a14="http://schemas.microsoft.com/office/drawing/2010/main" val="0"/>
+              </a:ext>
+            </a:extLst>
+          </a:blip>
+          <a:stretch>
+            <a:fillRect/>
+          </a:stretch>
+        </p:blipFill>
+        <p:spPr>
+          <a:xfrm>
+            <a:off x="3847345" y="4123553"/>
+            <a:ext cx="859114" cy="557106"/>
+          </a:xfrm>
+          <a:prstGeom prst="rect">
+            <a:avLst/>
+          </a:prstGeom>
+        </p:spPr>
+      </p:pic>
+    </p:spTree>
+    <p:extLst>
+      <p:ext uri="{BB962C8B-B14F-4D97-AF65-F5344CB8AC3E}">
+        <p14:creationId xmlns:p14="http://schemas.microsoft.com/office/powerpoint/2010/main" val="1654665863"/>
+      </p:ext>
+    </p:extLst>
+  </p:cSld>
+  <p:clrMapOvr>
+    <a:masterClrMapping/>
+  </p:clrMapOvr>
+</p:sld>
+</file>
+
+<file path=ppt/slides/slide11.xml><?xml version="1.0" encoding="utf-8"?>
+<p:sld xmlns:a="http://schemas.openxmlformats.org/drawingml/2006/main" xmlns:r="http://schemas.openxmlformats.org/officeDocument/2006/relationships" xmlns:p="http://schemas.openxmlformats.org/presentationml/2006/main">
+  <p:cSld>
+    <p:spTree>
+      <p:nvGrpSpPr>
+        <p:cNvPr id="1" name=""/>
+        <p:cNvGrpSpPr/>
+        <p:nvPr/>
+      </p:nvGrpSpPr>
+      <p:grpSpPr>
+        <a:xfrm>
+          <a:off x="0" y="0"/>
+          <a:ext cx="0" cy="0"/>
+          <a:chOff x="0" y="0"/>
+          <a:chExt cx="0" cy="0"/>
+        </a:xfrm>
+      </p:grpSpPr>
+      <p:sp>
+        <p:nvSpPr>
+          <p:cNvPr id="2" name="Title 1">
+            <a:extLst>
+              <a:ext uri="{FF2B5EF4-FFF2-40B4-BE49-F238E27FC236}">
                 <a16:creationId xmlns:a16="http://schemas.microsoft.com/office/drawing/2014/main" id="{8C23964A-CCE5-47DF-BFBF-BCDC3095C5CE}"/>
               </a:ext>
             </a:extLst>
@@ -42097,7 +43314,7 @@
 </p:sld>
 </file>
 
-<file path=ppt/slides/slide11.xml><?xml version="1.0" encoding="utf-8"?>
+<file path=ppt/slides/slide12.xml><?xml version="1.0" encoding="utf-8"?>
 <p:sld xmlns:a="http://schemas.openxmlformats.org/drawingml/2006/main" xmlns:r="http://schemas.openxmlformats.org/officeDocument/2006/relationships" xmlns:p="http://schemas.openxmlformats.org/presentationml/2006/main">
   <p:cSld>
     <p:spTree>
@@ -42185,7 +43402,7 @@
 </p:sld>
 </file>
 
-<file path=ppt/slides/slide12.xml><?xml version="1.0" encoding="utf-8"?>
+<file path=ppt/slides/slide13.xml><?xml version="1.0" encoding="utf-8"?>
 <p:sld xmlns:a="http://schemas.openxmlformats.org/drawingml/2006/main" xmlns:r="http://schemas.openxmlformats.org/officeDocument/2006/relationships" xmlns:p="http://schemas.openxmlformats.org/presentationml/2006/main">
   <p:cSld>
     <p:spTree>
@@ -42273,7 +43490,7 @@
 </p:sld>
 </file>
 
-<file path=ppt/slides/slide13.xml><?xml version="1.0" encoding="utf-8"?>
+<file path=ppt/slides/slide14.xml><?xml version="1.0" encoding="utf-8"?>
 <p:sld xmlns:a="http://schemas.openxmlformats.org/drawingml/2006/main" xmlns:r="http://schemas.openxmlformats.org/officeDocument/2006/relationships" xmlns:p="http://schemas.openxmlformats.org/presentationml/2006/main">
   <p:cSld>
     <p:spTree>
@@ -42438,7 +43655,7 @@
 </p:sld>
 </file>
 
-<file path=ppt/slides/slide14.xml><?xml version="1.0" encoding="utf-8"?>
+<file path=ppt/slides/slide15.xml><?xml version="1.0" encoding="utf-8"?>
 <p:sld xmlns:a="http://schemas.openxmlformats.org/drawingml/2006/main" xmlns:r="http://schemas.openxmlformats.org/officeDocument/2006/relationships" xmlns:p="http://schemas.openxmlformats.org/presentationml/2006/main">
   <p:cSld>
     <p:spTree>
@@ -42635,7 +43852,7 @@
 </p:sld>
 </file>
 
-<file path=ppt/slides/slide15.xml><?xml version="1.0" encoding="utf-8"?>
+<file path=ppt/slides/slide16.xml><?xml version="1.0" encoding="utf-8"?>
 <p:sld xmlns:a="http://schemas.openxmlformats.org/drawingml/2006/main" xmlns:r="http://schemas.openxmlformats.org/officeDocument/2006/relationships" xmlns:p="http://schemas.openxmlformats.org/presentationml/2006/main">
   <p:cSld>
     <p:spTree>
@@ -43637,7 +44854,7 @@
 </p:sld>
 </file>
 
-<file path=ppt/slides/slide16.xml><?xml version="1.0" encoding="utf-8"?>
+<file path=ppt/slides/slide17.xml><?xml version="1.0" encoding="utf-8"?>
 <p:sld xmlns:a="http://schemas.openxmlformats.org/drawingml/2006/main" xmlns:r="http://schemas.openxmlformats.org/officeDocument/2006/relationships" xmlns:p="http://schemas.openxmlformats.org/presentationml/2006/main">
   <p:cSld>
     <p:spTree>
@@ -46289,7 +47506,7 @@
 </p:sld>
 </file>
 
-<file path=ppt/slides/slide17.xml><?xml version="1.0" encoding="utf-8"?>
+<file path=ppt/slides/slide18.xml><?xml version="1.0" encoding="utf-8"?>
 <p:sld xmlns:a="http://schemas.openxmlformats.org/drawingml/2006/main" xmlns:r="http://schemas.openxmlformats.org/officeDocument/2006/relationships" xmlns:p="http://schemas.openxmlformats.org/presentationml/2006/main">
   <p:cSld>
     <p:spTree>
@@ -46373,7 +47590,7 @@
 </p:sld>
 </file>
 
-<file path=ppt/slides/slide18.xml><?xml version="1.0" encoding="utf-8"?>
+<file path=ppt/slides/slide19.xml><?xml version="1.0" encoding="utf-8"?>
 <p:sld xmlns:a="http://schemas.openxmlformats.org/drawingml/2006/main" xmlns:r="http://schemas.openxmlformats.org/officeDocument/2006/relationships" xmlns:p="http://schemas.openxmlformats.org/presentationml/2006/main">
   <p:cSld>
     <p:spTree>
@@ -46461,7 +47678,358 @@
 </p:sld>
 </file>
 
-<file path=ppt/slides/slide19.xml><?xml version="1.0" encoding="utf-8"?>
+<file path=ppt/slides/slide2.xml><?xml version="1.0" encoding="utf-8"?>
+<p:sld xmlns:a="http://schemas.openxmlformats.org/drawingml/2006/main" xmlns:r="http://schemas.openxmlformats.org/officeDocument/2006/relationships" xmlns:p="http://schemas.openxmlformats.org/presentationml/2006/main" show="0">
+  <p:cSld>
+    <p:bg>
+      <p:bgPr>
+        <a:solidFill>
+          <a:schemeClr val="tx2"/>
+        </a:solidFill>
+        <a:effectLst/>
+      </p:bgPr>
+    </p:bg>
+    <p:spTree>
+      <p:nvGrpSpPr>
+        <p:cNvPr id="1" name=""/>
+        <p:cNvGrpSpPr/>
+        <p:nvPr/>
+      </p:nvGrpSpPr>
+      <p:grpSpPr>
+        <a:xfrm>
+          <a:off x="0" y="0"/>
+          <a:ext cx="0" cy="0"/>
+          <a:chOff x="0" y="0"/>
+          <a:chExt cx="0" cy="0"/>
+        </a:xfrm>
+      </p:grpSpPr>
+      <p:sp>
+        <p:nvSpPr>
+          <p:cNvPr id="2" name="Title 1"/>
+          <p:cNvSpPr>
+            <a:spLocks noGrp="1"/>
+          </p:cNvSpPr>
+          <p:nvPr>
+            <p:ph type="title"/>
+          </p:nvPr>
+        </p:nvSpPr>
+        <p:spPr/>
+        <p:txBody>
+          <a:bodyPr/>
+          <a:lstStyle/>
+          <a:p>
+            <a:r>
+              <a:rPr lang="en-US" sz="1880" dirty="0"/>
+              <a:t>Agenda</a:t>
+            </a:r>
+          </a:p>
+        </p:txBody>
+      </p:sp>
+      <p:pic>
+        <p:nvPicPr>
+          <p:cNvPr id="4" name="Picture 2" descr="D:\Surendar Works\icons and images\box_shadow[1].png"/>
+          <p:cNvPicPr>
+            <a:picLocks noChangeAspect="1" noChangeArrowheads="1"/>
+          </p:cNvPicPr>
+          <p:nvPr/>
+        </p:nvPicPr>
+        <p:blipFill>
+          <a:blip r:embed="rId2" cstate="print">
+            <a:extLst>
+              <a:ext uri="{28A0092B-C50C-407E-A947-70E740481C1C}">
+                <a14:useLocalDpi xmlns:a14="http://schemas.microsoft.com/office/drawing/2010/main" val="0"/>
+              </a:ext>
+            </a:extLst>
+          </a:blip>
+          <a:srcRect/>
+          <a:stretch>
+            <a:fillRect/>
+          </a:stretch>
+        </p:blipFill>
+        <p:spPr bwMode="auto">
+          <a:xfrm rot="5400000">
+            <a:off x="1613883" y="2248016"/>
+            <a:ext cx="3916612" cy="301372"/>
+          </a:xfrm>
+          <a:prstGeom prst="rect">
+            <a:avLst/>
+          </a:prstGeom>
+          <a:noFill/>
+          <a:extLst>
+            <a:ext uri="{909E8E84-426E-40DD-AFC4-6F175D3DCCD1}">
+              <a14:hiddenFill xmlns:a14="http://schemas.microsoft.com/office/drawing/2010/main">
+                <a:solidFill>
+                  <a:srgbClr val="FFFFFF"/>
+                </a:solidFill>
+              </a14:hiddenFill>
+            </a:ext>
+          </a:extLst>
+        </p:spPr>
+      </p:pic>
+      <p:sp>
+        <p:nvSpPr>
+          <p:cNvPr id="6" name="TextBox 5"/>
+          <p:cNvSpPr txBox="1"/>
+          <p:nvPr/>
+        </p:nvSpPr>
+        <p:spPr bwMode="auto">
+          <a:xfrm>
+            <a:off x="3965883" y="440396"/>
+            <a:ext cx="5169332" cy="4112555"/>
+          </a:xfrm>
+          <a:prstGeom prst="rect">
+            <a:avLst/>
+          </a:prstGeom>
+          <a:noFill/>
+          <a:ln w="9525">
+            <a:noFill/>
+            <a:miter lim="800000"/>
+            <a:headEnd/>
+            <a:tailEnd/>
+          </a:ln>
+        </p:spPr>
+        <p:txBody>
+          <a:bodyPr wrap="square" rtlCol="0" anchor="ctr" anchorCtr="0">
+            <a:prstTxWarp prst="textNoShape">
+              <a:avLst/>
+            </a:prstTxWarp>
+            <a:noAutofit/>
+          </a:bodyPr>
+          <a:lstStyle/>
+          <a:p>
+            <a:pPr marL="395268" indent="-395268" defTabSz="685783" eaLnBrk="0" hangingPunct="0">
+              <a:spcAft>
+                <a:spcPts val="1200"/>
+              </a:spcAft>
+              <a:buClr>
+                <a:srgbClr val="00B0F0"/>
+              </a:buClr>
+              <a:buFont typeface="Wingdings 2" panose="05020102010507070707" pitchFamily="18" charset="2"/>
+              <a:buChar char=""/>
+            </a:pPr>
+            <a:r>
+              <a:rPr lang="en-US" sz="1600" dirty="0"/>
+              <a:t>What is </a:t>
+            </a:r>
+            <a:r>
+              <a:rPr lang="en-US" sz="1600" dirty="0" err="1"/>
+              <a:t>Serverless</a:t>
+            </a:r>
+            <a:r>
+              <a:rPr lang="en-US" sz="1600" dirty="0"/>
+              <a:t> Architecture</a:t>
+            </a:r>
+          </a:p>
+          <a:p>
+            <a:pPr marL="395268" indent="-395268" defTabSz="685783" eaLnBrk="0" hangingPunct="0">
+              <a:spcAft>
+                <a:spcPts val="1200"/>
+              </a:spcAft>
+              <a:buClr>
+                <a:srgbClr val="00B0F0"/>
+              </a:buClr>
+              <a:buFont typeface="Wingdings 2" panose="05020102010507070707" pitchFamily="18" charset="2"/>
+              <a:buChar char=""/>
+            </a:pPr>
+            <a:r>
+              <a:rPr lang="en-US" sz="1600" dirty="0"/>
+              <a:t>What is charged in </a:t>
+            </a:r>
+            <a:r>
+              <a:rPr lang="en-US" sz="1600" dirty="0" err="1"/>
+              <a:t>Serverless</a:t>
+            </a:r>
+            <a:r>
+              <a:rPr lang="en-US" sz="1600" dirty="0"/>
+              <a:t> vs Normal API</a:t>
+            </a:r>
+          </a:p>
+          <a:p>
+            <a:pPr marL="395268" indent="-395268" defTabSz="685783" eaLnBrk="0" hangingPunct="0">
+              <a:spcAft>
+                <a:spcPts val="1200"/>
+              </a:spcAft>
+              <a:buClr>
+                <a:srgbClr val="00B0F0"/>
+              </a:buClr>
+              <a:buFont typeface="Wingdings 2" panose="05020102010507070707" pitchFamily="18" charset="2"/>
+              <a:buChar char=""/>
+            </a:pPr>
+            <a:r>
+              <a:rPr lang="en-US" sz="1600" dirty="0"/>
+              <a:t>Various Serverless Offering</a:t>
+            </a:r>
+          </a:p>
+          <a:p>
+            <a:pPr marL="395268" indent="-395268" defTabSz="685783" eaLnBrk="0" hangingPunct="0">
+              <a:spcAft>
+                <a:spcPts val="1200"/>
+              </a:spcAft>
+              <a:buClr>
+                <a:srgbClr val="00B0F0"/>
+              </a:buClr>
+              <a:buFont typeface="Wingdings 2" panose="05020102010507070707" pitchFamily="18" charset="2"/>
+              <a:buChar char=""/>
+            </a:pPr>
+            <a:r>
+              <a:rPr lang="en-US" sz="1600" dirty="0"/>
+              <a:t>Open Source Serverless Pros and Cons</a:t>
+            </a:r>
+          </a:p>
+          <a:p>
+            <a:pPr marL="395268" indent="-395268" defTabSz="685783" eaLnBrk="0" hangingPunct="0">
+              <a:spcAft>
+                <a:spcPts val="1200"/>
+              </a:spcAft>
+              <a:buClr>
+                <a:srgbClr val="00B0F0"/>
+              </a:buClr>
+              <a:buFont typeface="Wingdings 2" panose="05020102010507070707" pitchFamily="18" charset="2"/>
+              <a:buChar char=""/>
+            </a:pPr>
+            <a:r>
+              <a:rPr lang="en-US" sz="1600" dirty="0"/>
+              <a:t>Azure function 2.0 Architecture</a:t>
+            </a:r>
+          </a:p>
+          <a:p>
+            <a:pPr marL="395268" indent="-395268" defTabSz="685783" eaLnBrk="0" hangingPunct="0">
+              <a:spcAft>
+                <a:spcPts val="1200"/>
+              </a:spcAft>
+              <a:buClr>
+                <a:srgbClr val="00B0F0"/>
+              </a:buClr>
+              <a:buFont typeface="Wingdings 2" panose="05020102010507070707" pitchFamily="18" charset="2"/>
+              <a:buChar char=""/>
+            </a:pPr>
+            <a:r>
+              <a:rPr lang="en-US" sz="1600" dirty="0"/>
+              <a:t>Azure function Uniqueness</a:t>
+            </a:r>
+          </a:p>
+          <a:p>
+            <a:pPr marL="395268" indent="-395268" defTabSz="685783" eaLnBrk="0" hangingPunct="0">
+              <a:spcAft>
+                <a:spcPts val="1200"/>
+              </a:spcAft>
+              <a:buClr>
+                <a:srgbClr val="00B0F0"/>
+              </a:buClr>
+              <a:buFont typeface="Wingdings 2" panose="05020102010507070707" pitchFamily="18" charset="2"/>
+              <a:buChar char=""/>
+            </a:pPr>
+            <a:r>
+              <a:rPr lang="en-US" sz="1600" dirty="0"/>
+              <a:t>Input output binding</a:t>
+            </a:r>
+          </a:p>
+          <a:p>
+            <a:pPr marL="395268" indent="-395268" defTabSz="685783" eaLnBrk="0" hangingPunct="0">
+              <a:spcAft>
+                <a:spcPts val="1200"/>
+              </a:spcAft>
+              <a:buClr>
+                <a:srgbClr val="00B0F0"/>
+              </a:buClr>
+              <a:buFont typeface="Wingdings 2" panose="05020102010507070707" pitchFamily="18" charset="2"/>
+              <a:buChar char=""/>
+            </a:pPr>
+            <a:r>
+              <a:rPr lang="en-US" sz="1600" dirty="0"/>
+              <a:t>How to compose Function As Service</a:t>
+            </a:r>
+          </a:p>
+          <a:p>
+            <a:pPr marL="395268" indent="-395268" defTabSz="685783" eaLnBrk="0" hangingPunct="0">
+              <a:spcAft>
+                <a:spcPts val="1200"/>
+              </a:spcAft>
+              <a:buClr>
+                <a:srgbClr val="00B0F0"/>
+              </a:buClr>
+              <a:buFont typeface="Wingdings 2" panose="05020102010507070707" pitchFamily="18" charset="2"/>
+              <a:buChar char=""/>
+            </a:pPr>
+            <a:r>
+              <a:rPr lang="en-US" sz="1600" dirty="0">
+                <a:solidFill>
+                  <a:schemeClr val="accent3">
+                    <a:lumMod val="75000"/>
+                  </a:schemeClr>
+                </a:solidFill>
+              </a:rPr>
+              <a:t>Durable Function – Problem statement, Use case types, How it works</a:t>
+            </a:r>
+          </a:p>
+          <a:p>
+            <a:pPr marL="395268" indent="-395268" defTabSz="685783" eaLnBrk="0" hangingPunct="0">
+              <a:spcAft>
+                <a:spcPts val="1200"/>
+              </a:spcAft>
+              <a:buClr>
+                <a:srgbClr val="00B0F0"/>
+              </a:buClr>
+              <a:buFont typeface="Wingdings 2" panose="05020102010507070707" pitchFamily="18" charset="2"/>
+              <a:buChar char=""/>
+            </a:pPr>
+            <a:r>
+              <a:rPr lang="en-US" sz="1600" dirty="0">
+                <a:solidFill>
+                  <a:schemeClr val="accent3">
+                    <a:lumMod val="75000"/>
+                  </a:schemeClr>
+                </a:solidFill>
+              </a:rPr>
+              <a:t>Logic App Vs Durable Function</a:t>
+            </a:r>
+          </a:p>
+        </p:txBody>
+      </p:sp>
+      <p:pic>
+        <p:nvPicPr>
+          <p:cNvPr id="9" name="Picture 8"/>
+          <p:cNvPicPr>
+            <a:picLocks noChangeAspect="1"/>
+          </p:cNvPicPr>
+          <p:nvPr/>
+        </p:nvPicPr>
+        <p:blipFill>
+          <a:blip r:embed="rId3">
+            <a:extLst>
+              <a:ext uri="{28A0092B-C50C-407E-A947-70E740481C1C}">
+                <a14:useLocalDpi xmlns:a14="http://schemas.microsoft.com/office/drawing/2010/main" val="0"/>
+              </a:ext>
+            </a:extLst>
+          </a:blip>
+          <a:stretch>
+            <a:fillRect/>
+          </a:stretch>
+        </p:blipFill>
+        <p:spPr>
+          <a:xfrm>
+            <a:off x="771829" y="1483331"/>
+            <a:ext cx="2283810" cy="2176840"/>
+          </a:xfrm>
+          <a:prstGeom prst="rect">
+            <a:avLst/>
+          </a:prstGeom>
+        </p:spPr>
+      </p:pic>
+    </p:spTree>
+    <p:extLst>
+      <p:ext uri="{BB962C8B-B14F-4D97-AF65-F5344CB8AC3E}">
+        <p14:creationId xmlns:p14="http://schemas.microsoft.com/office/powerpoint/2010/main" val="1390877008"/>
+      </p:ext>
+    </p:extLst>
+  </p:cSld>
+  <p:clrMapOvr>
+    <a:masterClrMapping/>
+  </p:clrMapOvr>
+</p:sld>
+</file>
+
+<file path=ppt/slides/slide20.xml><?xml version="1.0" encoding="utf-8"?>
 <p:sld xmlns:a="http://schemas.openxmlformats.org/drawingml/2006/main" xmlns:r="http://schemas.openxmlformats.org/officeDocument/2006/relationships" xmlns:p="http://schemas.openxmlformats.org/presentationml/2006/main">
   <p:cSld>
     <p:spTree>
@@ -47167,358 +48735,7 @@
 </p:sld>
 </file>
 
-<file path=ppt/slides/slide2.xml><?xml version="1.0" encoding="utf-8"?>
-<p:sld xmlns:a="http://schemas.openxmlformats.org/drawingml/2006/main" xmlns:r="http://schemas.openxmlformats.org/officeDocument/2006/relationships" xmlns:p="http://schemas.openxmlformats.org/presentationml/2006/main" show="0">
-  <p:cSld>
-    <p:bg>
-      <p:bgPr>
-        <a:solidFill>
-          <a:schemeClr val="tx2"/>
-        </a:solidFill>
-        <a:effectLst/>
-      </p:bgPr>
-    </p:bg>
-    <p:spTree>
-      <p:nvGrpSpPr>
-        <p:cNvPr id="1" name=""/>
-        <p:cNvGrpSpPr/>
-        <p:nvPr/>
-      </p:nvGrpSpPr>
-      <p:grpSpPr>
-        <a:xfrm>
-          <a:off x="0" y="0"/>
-          <a:ext cx="0" cy="0"/>
-          <a:chOff x="0" y="0"/>
-          <a:chExt cx="0" cy="0"/>
-        </a:xfrm>
-      </p:grpSpPr>
-      <p:sp>
-        <p:nvSpPr>
-          <p:cNvPr id="2" name="Title 1"/>
-          <p:cNvSpPr>
-            <a:spLocks noGrp="1"/>
-          </p:cNvSpPr>
-          <p:nvPr>
-            <p:ph type="title"/>
-          </p:nvPr>
-        </p:nvSpPr>
-        <p:spPr/>
-        <p:txBody>
-          <a:bodyPr/>
-          <a:lstStyle/>
-          <a:p>
-            <a:r>
-              <a:rPr lang="en-US" sz="1880" dirty="0"/>
-              <a:t>Agenda</a:t>
-            </a:r>
-          </a:p>
-        </p:txBody>
-      </p:sp>
-      <p:pic>
-        <p:nvPicPr>
-          <p:cNvPr id="4" name="Picture 2" descr="D:\Surendar Works\icons and images\box_shadow[1].png"/>
-          <p:cNvPicPr>
-            <a:picLocks noChangeAspect="1" noChangeArrowheads="1"/>
-          </p:cNvPicPr>
-          <p:nvPr/>
-        </p:nvPicPr>
-        <p:blipFill>
-          <a:blip r:embed="rId2" cstate="print">
-            <a:extLst>
-              <a:ext uri="{28A0092B-C50C-407E-A947-70E740481C1C}">
-                <a14:useLocalDpi xmlns:a14="http://schemas.microsoft.com/office/drawing/2010/main" val="0"/>
-              </a:ext>
-            </a:extLst>
-          </a:blip>
-          <a:srcRect/>
-          <a:stretch>
-            <a:fillRect/>
-          </a:stretch>
-        </p:blipFill>
-        <p:spPr bwMode="auto">
-          <a:xfrm rot="5400000">
-            <a:off x="1613883" y="2248016"/>
-            <a:ext cx="3916612" cy="301372"/>
-          </a:xfrm>
-          <a:prstGeom prst="rect">
-            <a:avLst/>
-          </a:prstGeom>
-          <a:noFill/>
-          <a:extLst>
-            <a:ext uri="{909E8E84-426E-40DD-AFC4-6F175D3DCCD1}">
-              <a14:hiddenFill xmlns:a14="http://schemas.microsoft.com/office/drawing/2010/main">
-                <a:solidFill>
-                  <a:srgbClr val="FFFFFF"/>
-                </a:solidFill>
-              </a14:hiddenFill>
-            </a:ext>
-          </a:extLst>
-        </p:spPr>
-      </p:pic>
-      <p:sp>
-        <p:nvSpPr>
-          <p:cNvPr id="6" name="TextBox 5"/>
-          <p:cNvSpPr txBox="1"/>
-          <p:nvPr/>
-        </p:nvSpPr>
-        <p:spPr bwMode="auto">
-          <a:xfrm>
-            <a:off x="3965883" y="440396"/>
-            <a:ext cx="5169332" cy="4112555"/>
-          </a:xfrm>
-          <a:prstGeom prst="rect">
-            <a:avLst/>
-          </a:prstGeom>
-          <a:noFill/>
-          <a:ln w="9525">
-            <a:noFill/>
-            <a:miter lim="800000"/>
-            <a:headEnd/>
-            <a:tailEnd/>
-          </a:ln>
-        </p:spPr>
-        <p:txBody>
-          <a:bodyPr wrap="square" rtlCol="0" anchor="ctr" anchorCtr="0">
-            <a:prstTxWarp prst="textNoShape">
-              <a:avLst/>
-            </a:prstTxWarp>
-            <a:noAutofit/>
-          </a:bodyPr>
-          <a:lstStyle/>
-          <a:p>
-            <a:pPr marL="395268" indent="-395268" defTabSz="685783" eaLnBrk="0" hangingPunct="0">
-              <a:spcAft>
-                <a:spcPts val="1200"/>
-              </a:spcAft>
-              <a:buClr>
-                <a:srgbClr val="00B0F0"/>
-              </a:buClr>
-              <a:buFont typeface="Wingdings 2" panose="05020102010507070707" pitchFamily="18" charset="2"/>
-              <a:buChar char=""/>
-            </a:pPr>
-            <a:r>
-              <a:rPr lang="en-US" sz="1600" dirty="0"/>
-              <a:t>What is </a:t>
-            </a:r>
-            <a:r>
-              <a:rPr lang="en-US" sz="1600" dirty="0" err="1"/>
-              <a:t>Serverless</a:t>
-            </a:r>
-            <a:r>
-              <a:rPr lang="en-US" sz="1600" dirty="0"/>
-              <a:t> Architecture</a:t>
-            </a:r>
-          </a:p>
-          <a:p>
-            <a:pPr marL="395268" indent="-395268" defTabSz="685783" eaLnBrk="0" hangingPunct="0">
-              <a:spcAft>
-                <a:spcPts val="1200"/>
-              </a:spcAft>
-              <a:buClr>
-                <a:srgbClr val="00B0F0"/>
-              </a:buClr>
-              <a:buFont typeface="Wingdings 2" panose="05020102010507070707" pitchFamily="18" charset="2"/>
-              <a:buChar char=""/>
-            </a:pPr>
-            <a:r>
-              <a:rPr lang="en-US" sz="1600" dirty="0"/>
-              <a:t>What is charged in </a:t>
-            </a:r>
-            <a:r>
-              <a:rPr lang="en-US" sz="1600" dirty="0" err="1"/>
-              <a:t>Serverless</a:t>
-            </a:r>
-            <a:r>
-              <a:rPr lang="en-US" sz="1600" dirty="0"/>
-              <a:t> vs Normal API</a:t>
-            </a:r>
-          </a:p>
-          <a:p>
-            <a:pPr marL="395268" indent="-395268" defTabSz="685783" eaLnBrk="0" hangingPunct="0">
-              <a:spcAft>
-                <a:spcPts val="1200"/>
-              </a:spcAft>
-              <a:buClr>
-                <a:srgbClr val="00B0F0"/>
-              </a:buClr>
-              <a:buFont typeface="Wingdings 2" panose="05020102010507070707" pitchFamily="18" charset="2"/>
-              <a:buChar char=""/>
-            </a:pPr>
-            <a:r>
-              <a:rPr lang="en-US" sz="1600" dirty="0"/>
-              <a:t>Various Serverless Offering</a:t>
-            </a:r>
-          </a:p>
-          <a:p>
-            <a:pPr marL="395268" indent="-395268" defTabSz="685783" eaLnBrk="0" hangingPunct="0">
-              <a:spcAft>
-                <a:spcPts val="1200"/>
-              </a:spcAft>
-              <a:buClr>
-                <a:srgbClr val="00B0F0"/>
-              </a:buClr>
-              <a:buFont typeface="Wingdings 2" panose="05020102010507070707" pitchFamily="18" charset="2"/>
-              <a:buChar char=""/>
-            </a:pPr>
-            <a:r>
-              <a:rPr lang="en-US" sz="1600" dirty="0"/>
-              <a:t>Open Source Serverless Pros and Cons</a:t>
-            </a:r>
-          </a:p>
-          <a:p>
-            <a:pPr marL="395268" indent="-395268" defTabSz="685783" eaLnBrk="0" hangingPunct="0">
-              <a:spcAft>
-                <a:spcPts val="1200"/>
-              </a:spcAft>
-              <a:buClr>
-                <a:srgbClr val="00B0F0"/>
-              </a:buClr>
-              <a:buFont typeface="Wingdings 2" panose="05020102010507070707" pitchFamily="18" charset="2"/>
-              <a:buChar char=""/>
-            </a:pPr>
-            <a:r>
-              <a:rPr lang="en-US" sz="1600" dirty="0"/>
-              <a:t>Azure function 2.0 Architecture</a:t>
-            </a:r>
-          </a:p>
-          <a:p>
-            <a:pPr marL="395268" indent="-395268" defTabSz="685783" eaLnBrk="0" hangingPunct="0">
-              <a:spcAft>
-                <a:spcPts val="1200"/>
-              </a:spcAft>
-              <a:buClr>
-                <a:srgbClr val="00B0F0"/>
-              </a:buClr>
-              <a:buFont typeface="Wingdings 2" panose="05020102010507070707" pitchFamily="18" charset="2"/>
-              <a:buChar char=""/>
-            </a:pPr>
-            <a:r>
-              <a:rPr lang="en-US" sz="1600" dirty="0"/>
-              <a:t>Azure function Uniqueness</a:t>
-            </a:r>
-          </a:p>
-          <a:p>
-            <a:pPr marL="395268" indent="-395268" defTabSz="685783" eaLnBrk="0" hangingPunct="0">
-              <a:spcAft>
-                <a:spcPts val="1200"/>
-              </a:spcAft>
-              <a:buClr>
-                <a:srgbClr val="00B0F0"/>
-              </a:buClr>
-              <a:buFont typeface="Wingdings 2" panose="05020102010507070707" pitchFamily="18" charset="2"/>
-              <a:buChar char=""/>
-            </a:pPr>
-            <a:r>
-              <a:rPr lang="en-US" sz="1600" dirty="0"/>
-              <a:t>Input output binding</a:t>
-            </a:r>
-          </a:p>
-          <a:p>
-            <a:pPr marL="395268" indent="-395268" defTabSz="685783" eaLnBrk="0" hangingPunct="0">
-              <a:spcAft>
-                <a:spcPts val="1200"/>
-              </a:spcAft>
-              <a:buClr>
-                <a:srgbClr val="00B0F0"/>
-              </a:buClr>
-              <a:buFont typeface="Wingdings 2" panose="05020102010507070707" pitchFamily="18" charset="2"/>
-              <a:buChar char=""/>
-            </a:pPr>
-            <a:r>
-              <a:rPr lang="en-US" sz="1600" dirty="0"/>
-              <a:t>How to compose Function As Service</a:t>
-            </a:r>
-          </a:p>
-          <a:p>
-            <a:pPr marL="395268" indent="-395268" defTabSz="685783" eaLnBrk="0" hangingPunct="0">
-              <a:spcAft>
-                <a:spcPts val="1200"/>
-              </a:spcAft>
-              <a:buClr>
-                <a:srgbClr val="00B0F0"/>
-              </a:buClr>
-              <a:buFont typeface="Wingdings 2" panose="05020102010507070707" pitchFamily="18" charset="2"/>
-              <a:buChar char=""/>
-            </a:pPr>
-            <a:r>
-              <a:rPr lang="en-US" sz="1600" dirty="0">
-                <a:solidFill>
-                  <a:schemeClr val="accent3">
-                    <a:lumMod val="75000"/>
-                  </a:schemeClr>
-                </a:solidFill>
-              </a:rPr>
-              <a:t>Durable Function – Problem statement, Use case types, How it works</a:t>
-            </a:r>
-          </a:p>
-          <a:p>
-            <a:pPr marL="395268" indent="-395268" defTabSz="685783" eaLnBrk="0" hangingPunct="0">
-              <a:spcAft>
-                <a:spcPts val="1200"/>
-              </a:spcAft>
-              <a:buClr>
-                <a:srgbClr val="00B0F0"/>
-              </a:buClr>
-              <a:buFont typeface="Wingdings 2" panose="05020102010507070707" pitchFamily="18" charset="2"/>
-              <a:buChar char=""/>
-            </a:pPr>
-            <a:r>
-              <a:rPr lang="en-US" sz="1600" dirty="0">
-                <a:solidFill>
-                  <a:schemeClr val="accent3">
-                    <a:lumMod val="75000"/>
-                  </a:schemeClr>
-                </a:solidFill>
-              </a:rPr>
-              <a:t>Logic App Vs Durable Function</a:t>
-            </a:r>
-          </a:p>
-        </p:txBody>
-      </p:sp>
-      <p:pic>
-        <p:nvPicPr>
-          <p:cNvPr id="9" name="Picture 8"/>
-          <p:cNvPicPr>
-            <a:picLocks noChangeAspect="1"/>
-          </p:cNvPicPr>
-          <p:nvPr/>
-        </p:nvPicPr>
-        <p:blipFill>
-          <a:blip r:embed="rId3">
-            <a:extLst>
-              <a:ext uri="{28A0092B-C50C-407E-A947-70E740481C1C}">
-                <a14:useLocalDpi xmlns:a14="http://schemas.microsoft.com/office/drawing/2010/main" val="0"/>
-              </a:ext>
-            </a:extLst>
-          </a:blip>
-          <a:stretch>
-            <a:fillRect/>
-          </a:stretch>
-        </p:blipFill>
-        <p:spPr>
-          <a:xfrm>
-            <a:off x="771829" y="1483331"/>
-            <a:ext cx="2283810" cy="2176840"/>
-          </a:xfrm>
-          <a:prstGeom prst="rect">
-            <a:avLst/>
-          </a:prstGeom>
-        </p:spPr>
-      </p:pic>
-    </p:spTree>
-    <p:extLst>
-      <p:ext uri="{BB962C8B-B14F-4D97-AF65-F5344CB8AC3E}">
-        <p14:creationId xmlns:p14="http://schemas.microsoft.com/office/powerpoint/2010/main" val="1390877008"/>
-      </p:ext>
-    </p:extLst>
-  </p:cSld>
-  <p:clrMapOvr>
-    <a:masterClrMapping/>
-  </p:clrMapOvr>
-</p:sld>
-</file>
-
-<file path=ppt/slides/slide20.xml><?xml version="1.0" encoding="utf-8"?>
+<file path=ppt/slides/slide21.xml><?xml version="1.0" encoding="utf-8"?>
 <p:sld xmlns:a="http://schemas.openxmlformats.org/drawingml/2006/main" xmlns:r="http://schemas.openxmlformats.org/officeDocument/2006/relationships" xmlns:p="http://schemas.openxmlformats.org/presentationml/2006/main">
   <p:cSld>
     <p:spTree>
@@ -48222,7 +49439,7 @@
 </p:sld>
 </file>
 
-<file path=ppt/slides/slide21.xml><?xml version="1.0" encoding="utf-8"?>
+<file path=ppt/slides/slide22.xml><?xml version="1.0" encoding="utf-8"?>
 <p:sld xmlns:a="http://schemas.openxmlformats.org/drawingml/2006/main" xmlns:r="http://schemas.openxmlformats.org/officeDocument/2006/relationships" xmlns:p="http://schemas.openxmlformats.org/presentationml/2006/main">
   <p:cSld>
     <p:spTree>
@@ -49063,7 +50280,7 @@
 </p:sld>
 </file>
 
-<file path=ppt/slides/slide22.xml><?xml version="1.0" encoding="utf-8"?>
+<file path=ppt/slides/slide23.xml><?xml version="1.0" encoding="utf-8"?>
 <p:sld xmlns:a="http://schemas.openxmlformats.org/drawingml/2006/main" xmlns:r="http://schemas.openxmlformats.org/officeDocument/2006/relationships" xmlns:p="http://schemas.openxmlformats.org/presentationml/2006/main">
   <p:cSld>
     <p:spTree>
@@ -50056,7 +51273,7 @@
 </p:sld>
 </file>
 
-<file path=ppt/slides/slide23.xml><?xml version="1.0" encoding="utf-8"?>
+<file path=ppt/slides/slide24.xml><?xml version="1.0" encoding="utf-8"?>
 <p:sld xmlns:a="http://schemas.openxmlformats.org/drawingml/2006/main" xmlns:r="http://schemas.openxmlformats.org/officeDocument/2006/relationships" xmlns:p="http://schemas.openxmlformats.org/presentationml/2006/main">
   <p:cSld>
     <p:spTree>
@@ -51094,7 +52311,7 @@
 </p:sld>
 </file>
 
-<file path=ppt/slides/slide24.xml><?xml version="1.0" encoding="utf-8"?>
+<file path=ppt/slides/slide25.xml><?xml version="1.0" encoding="utf-8"?>
 <p:sld xmlns:a="http://schemas.openxmlformats.org/drawingml/2006/main" xmlns:r="http://schemas.openxmlformats.org/officeDocument/2006/relationships" xmlns:p="http://schemas.openxmlformats.org/presentationml/2006/main">
   <p:cSld>
     <p:spTree>
@@ -51858,7 +53075,7 @@
 </p:sld>
 </file>
 
-<file path=ppt/slides/slide25.xml><?xml version="1.0" encoding="utf-8"?>
+<file path=ppt/slides/slide26.xml><?xml version="1.0" encoding="utf-8"?>
 <p:sld xmlns:a="http://schemas.openxmlformats.org/drawingml/2006/main" xmlns:r="http://schemas.openxmlformats.org/officeDocument/2006/relationships" xmlns:p="http://schemas.openxmlformats.org/presentationml/2006/main">
   <p:cSld>
     <p:spTree>
@@ -52647,7 +53864,7 @@
 </p:sld>
 </file>
 
-<file path=ppt/slides/slide26.xml><?xml version="1.0" encoding="utf-8"?>
+<file path=ppt/slides/slide27.xml><?xml version="1.0" encoding="utf-8"?>
 <p:sld xmlns:a="http://schemas.openxmlformats.org/drawingml/2006/main" xmlns:r="http://schemas.openxmlformats.org/officeDocument/2006/relationships" xmlns:p="http://schemas.openxmlformats.org/presentationml/2006/main">
   <p:cSld>
     <p:spTree>
@@ -52742,7 +53959,7 @@
 </p:sld>
 </file>
 
-<file path=ppt/slides/slide27.xml><?xml version="1.0" encoding="utf-8"?>
+<file path=ppt/slides/slide28.xml><?xml version="1.0" encoding="utf-8"?>
 <p:sld xmlns:a="http://schemas.openxmlformats.org/drawingml/2006/main" xmlns:r="http://schemas.openxmlformats.org/officeDocument/2006/relationships" xmlns:p="http://schemas.openxmlformats.org/presentationml/2006/main">
   <p:cSld>
     <p:spTree>
@@ -54518,6 +55735,354 @@
           <p:cNvPr id="2" name="Title 1">
             <a:extLst>
               <a:ext uri="{FF2B5EF4-FFF2-40B4-BE49-F238E27FC236}">
+                <a16:creationId xmlns:a16="http://schemas.microsoft.com/office/drawing/2014/main" id="{81B6DBCC-4A5C-4797-879E-88A83E6AFEBF}"/>
+              </a:ext>
+            </a:extLst>
+          </p:cNvPr>
+          <p:cNvSpPr>
+            <a:spLocks noGrp="1"/>
+          </p:cNvSpPr>
+          <p:nvPr>
+            <p:ph type="title"/>
+          </p:nvPr>
+        </p:nvSpPr>
+        <p:spPr/>
+        <p:txBody>
+          <a:bodyPr/>
+          <a:lstStyle/>
+          <a:p>
+            <a:r>
+              <a:rPr lang="en-US" dirty="0"/>
+              <a:t>Advantage of Choosing Cloud Extension </a:t>
+            </a:r>
+            <a:r>
+              <a:rPr lang="en-US" dirty="0" err="1"/>
+              <a:t>FaaS</a:t>
+            </a:r>
+            <a:endParaRPr lang="en-US" dirty="0"/>
+          </a:p>
+        </p:txBody>
+      </p:sp>
+      <p:sp>
+        <p:nvSpPr>
+          <p:cNvPr id="3" name="Text Placeholder 2">
+            <a:extLst>
+              <a:ext uri="{FF2B5EF4-FFF2-40B4-BE49-F238E27FC236}">
+                <a16:creationId xmlns:a16="http://schemas.microsoft.com/office/drawing/2014/main" id="{E494898E-5A28-4E6B-888B-8AE97C53736E}"/>
+              </a:ext>
+            </a:extLst>
+          </p:cNvPr>
+          <p:cNvSpPr>
+            <a:spLocks noGrp="1"/>
+          </p:cNvSpPr>
+          <p:nvPr>
+            <p:ph type="body" sz="quarter" idx="13"/>
+          </p:nvPr>
+        </p:nvSpPr>
+        <p:spPr/>
+        <p:txBody>
+          <a:bodyPr>
+            <a:normAutofit lnSpcReduction="10000"/>
+          </a:bodyPr>
+          <a:lstStyle/>
+          <a:p>
+            <a:pPr marL="342900" indent="-342900">
+              <a:buFont typeface="Arial" panose="020B0604020202020204" pitchFamily="34" charset="0"/>
+              <a:buChar char="•"/>
+            </a:pPr>
+            <a:r>
+              <a:rPr lang="en-US" sz="1400" dirty="0">
+                <a:solidFill>
+                  <a:schemeClr val="accent3">
+                    <a:lumMod val="75000"/>
+                  </a:schemeClr>
+                </a:solidFill>
+              </a:rPr>
+              <a:t>If we choose any Kubernetes based </a:t>
+            </a:r>
+            <a:r>
+              <a:rPr lang="en-US" sz="1400" dirty="0" err="1">
+                <a:solidFill>
+                  <a:schemeClr val="accent3">
+                    <a:lumMod val="75000"/>
+                  </a:schemeClr>
+                </a:solidFill>
+              </a:rPr>
+              <a:t>FaaS</a:t>
+            </a:r>
+            <a:r>
+              <a:rPr lang="en-US" sz="1400" dirty="0">
+                <a:solidFill>
+                  <a:schemeClr val="accent3">
+                    <a:lumMod val="75000"/>
+                  </a:schemeClr>
+                </a:solidFill>
+              </a:rPr>
+              <a:t> then we would have to have Kubernetes on public cloud provider</a:t>
+            </a:r>
+          </a:p>
+          <a:p>
+            <a:pPr marL="342900" indent="-342900">
+              <a:buFont typeface="Arial" panose="020B0604020202020204" pitchFamily="34" charset="0"/>
+              <a:buChar char="•"/>
+            </a:pPr>
+            <a:r>
+              <a:rPr lang="en-US" sz="1400" dirty="0">
+                <a:solidFill>
+                  <a:schemeClr val="accent3">
+                    <a:lumMod val="75000"/>
+                  </a:schemeClr>
+                </a:solidFill>
+              </a:rPr>
+              <a:t>We need to ensure that the </a:t>
+            </a:r>
+            <a:r>
+              <a:rPr lang="en-US" sz="1400" dirty="0" err="1">
+                <a:solidFill>
+                  <a:schemeClr val="accent3">
+                    <a:lumMod val="75000"/>
+                  </a:schemeClr>
+                </a:solidFill>
+              </a:rPr>
+              <a:t>FaaS</a:t>
+            </a:r>
+            <a:r>
+              <a:rPr lang="en-US" sz="1400" dirty="0">
+                <a:solidFill>
+                  <a:schemeClr val="accent3">
+                    <a:lumMod val="75000"/>
+                  </a:schemeClr>
+                </a:solidFill>
+              </a:rPr>
+              <a:t> can run seamlessly in managed provider</a:t>
+            </a:r>
+          </a:p>
+          <a:p>
+            <a:pPr marL="342900" indent="-342900">
+              <a:buFont typeface="Arial" panose="020B0604020202020204" pitchFamily="34" charset="0"/>
+              <a:buChar char="•"/>
+            </a:pPr>
+            <a:r>
+              <a:rPr lang="en-US" sz="1400" dirty="0">
+                <a:solidFill>
+                  <a:schemeClr val="accent3">
+                    <a:lumMod val="75000"/>
+                  </a:schemeClr>
+                </a:solidFill>
+              </a:rPr>
+              <a:t>Every cloud provider has their home grown </a:t>
+            </a:r>
+            <a:r>
+              <a:rPr lang="en-US" sz="1400" dirty="0" err="1">
+                <a:solidFill>
+                  <a:schemeClr val="accent3">
+                    <a:lumMod val="75000"/>
+                  </a:schemeClr>
+                </a:solidFill>
+              </a:rPr>
+              <a:t>FaaS</a:t>
+            </a:r>
+            <a:r>
+              <a:rPr lang="en-US" sz="1400" dirty="0">
+                <a:solidFill>
+                  <a:schemeClr val="accent3">
+                    <a:lumMod val="75000"/>
+                  </a:schemeClr>
+                </a:solidFill>
+              </a:rPr>
+              <a:t>, which are much cheaper than the maintaining Kubernetes cluster.</a:t>
+            </a:r>
+          </a:p>
+          <a:p>
+            <a:pPr marL="342900" indent="-342900">
+              <a:buFont typeface="Arial" panose="020B0604020202020204" pitchFamily="34" charset="0"/>
+              <a:buChar char="•"/>
+            </a:pPr>
+            <a:r>
+              <a:rPr lang="en-US" sz="1400" dirty="0">
+                <a:solidFill>
+                  <a:schemeClr val="accent3">
+                    <a:lumMod val="75000"/>
+                  </a:schemeClr>
+                </a:solidFill>
+              </a:rPr>
+              <a:t>Unlike Kubernetes cluster we need not worry about patching or upgrading Kubernetes</a:t>
+            </a:r>
+          </a:p>
+          <a:p>
+            <a:pPr marL="342900" indent="-342900">
+              <a:buFont typeface="Arial" panose="020B0604020202020204" pitchFamily="34" charset="0"/>
+              <a:buChar char="•"/>
+            </a:pPr>
+            <a:r>
+              <a:rPr lang="en-US" sz="1400" dirty="0">
+                <a:solidFill>
+                  <a:schemeClr val="accent3">
+                    <a:lumMod val="75000"/>
+                  </a:schemeClr>
+                </a:solidFill>
+              </a:rPr>
+              <a:t>Security is provided OOB when we migrate to public cloud for all these </a:t>
+            </a:r>
+            <a:r>
+              <a:rPr lang="en-US" sz="1400" dirty="0" err="1">
+                <a:solidFill>
+                  <a:schemeClr val="accent3">
+                    <a:lumMod val="75000"/>
+                  </a:schemeClr>
+                </a:solidFill>
+              </a:rPr>
+              <a:t>FaaS</a:t>
+            </a:r>
+            <a:r>
+              <a:rPr lang="en-US" sz="1400" dirty="0">
+                <a:solidFill>
+                  <a:schemeClr val="accent3">
+                    <a:lumMod val="75000"/>
+                  </a:schemeClr>
+                </a:solidFill>
+              </a:rPr>
+              <a:t> against Kubernetes where we will have to configure it</a:t>
+            </a:r>
+          </a:p>
+          <a:p>
+            <a:pPr marL="342900" indent="-342900">
+              <a:buFont typeface="Arial" panose="020B0604020202020204" pitchFamily="34" charset="0"/>
+              <a:buChar char="•"/>
+            </a:pPr>
+            <a:r>
+              <a:rPr lang="en-US" sz="1400" dirty="0">
+                <a:solidFill>
+                  <a:schemeClr val="accent3">
+                    <a:lumMod val="75000"/>
+                  </a:schemeClr>
+                </a:solidFill>
+              </a:rPr>
+              <a:t>Backing services like Logging and Monitoring will be offered OOB for managed </a:t>
+            </a:r>
+            <a:r>
+              <a:rPr lang="en-US" sz="1400" dirty="0" err="1">
+                <a:solidFill>
+                  <a:schemeClr val="accent3">
+                    <a:lumMod val="75000"/>
+                  </a:schemeClr>
+                </a:solidFill>
+              </a:rPr>
+              <a:t>FaaS</a:t>
+            </a:r>
+            <a:r>
+              <a:rPr lang="en-US" sz="1400" dirty="0">
+                <a:solidFill>
+                  <a:schemeClr val="accent3">
+                    <a:lumMod val="75000"/>
+                  </a:schemeClr>
+                </a:solidFill>
+              </a:rPr>
+              <a:t> in that cloud provider rather than we working that.</a:t>
+            </a:r>
+          </a:p>
+          <a:p>
+            <a:pPr marL="342900" indent="-342900">
+              <a:buFont typeface="Arial" panose="020B0604020202020204" pitchFamily="34" charset="0"/>
+              <a:buChar char="•"/>
+            </a:pPr>
+            <a:r>
+              <a:rPr lang="en-US" sz="1400" dirty="0">
+                <a:solidFill>
+                  <a:schemeClr val="accent3">
+                    <a:lumMod val="75000"/>
+                  </a:schemeClr>
+                </a:solidFill>
+              </a:rPr>
+              <a:t>The serverless aspects like Hot start, cold start, Running on multiple nodes, state maintenance in case of orchestration will all be provided by the Public provider rather than we configuring it</a:t>
+            </a:r>
+          </a:p>
+          <a:p>
+            <a:pPr marL="342900" indent="-342900">
+              <a:buFont typeface="Arial" panose="020B0604020202020204" pitchFamily="34" charset="0"/>
+              <a:buChar char="•"/>
+            </a:pPr>
+            <a:r>
+              <a:rPr lang="en-US" sz="1400" dirty="0">
+                <a:solidFill>
+                  <a:schemeClr val="accent3">
+                    <a:lumMod val="75000"/>
+                  </a:schemeClr>
+                </a:solidFill>
+              </a:rPr>
+              <a:t>When we move to that Target cloud provider and if we have chosen the </a:t>
+            </a:r>
+            <a:r>
+              <a:rPr lang="en-US" sz="1400" dirty="0" err="1">
+                <a:solidFill>
+                  <a:schemeClr val="accent3">
+                    <a:lumMod val="75000"/>
+                  </a:schemeClr>
+                </a:solidFill>
+              </a:rPr>
+              <a:t>FaaS</a:t>
+            </a:r>
+            <a:r>
+              <a:rPr lang="en-US" sz="1400" dirty="0">
+                <a:solidFill>
+                  <a:schemeClr val="accent3">
+                    <a:lumMod val="75000"/>
+                  </a:schemeClr>
+                </a:solidFill>
+              </a:rPr>
+              <a:t> that operated on that cloud provider then it is all changing the endpoint of CD and rest is all seamless</a:t>
+            </a:r>
+          </a:p>
+          <a:p>
+            <a:pPr marL="342900" indent="-342900">
+              <a:buFont typeface="Arial" panose="020B0604020202020204" pitchFamily="34" charset="0"/>
+              <a:buChar char="•"/>
+            </a:pPr>
+            <a:endParaRPr lang="en-US" sz="1200" dirty="0">
+              <a:solidFill>
+                <a:schemeClr val="accent3">
+                  <a:lumMod val="75000"/>
+                </a:schemeClr>
+              </a:solidFill>
+            </a:endParaRPr>
+          </a:p>
+        </p:txBody>
+      </p:sp>
+    </p:spTree>
+    <p:extLst>
+      <p:ext uri="{BB962C8B-B14F-4D97-AF65-F5344CB8AC3E}">
+        <p14:creationId xmlns:p14="http://schemas.microsoft.com/office/powerpoint/2010/main" val="938516000"/>
+      </p:ext>
+    </p:extLst>
+  </p:cSld>
+  <p:clrMapOvr>
+    <a:masterClrMapping/>
+  </p:clrMapOvr>
+</p:sld>
+</file>
+
+<file path=ppt/slides/slide9.xml><?xml version="1.0" encoding="utf-8"?>
+<p:sld xmlns:a="http://schemas.openxmlformats.org/drawingml/2006/main" xmlns:r="http://schemas.openxmlformats.org/officeDocument/2006/relationships" xmlns:p="http://schemas.openxmlformats.org/presentationml/2006/main">
+  <p:cSld>
+    <p:spTree>
+      <p:nvGrpSpPr>
+        <p:cNvPr id="1" name=""/>
+        <p:cNvGrpSpPr/>
+        <p:nvPr/>
+      </p:nvGrpSpPr>
+      <p:grpSpPr>
+        <a:xfrm>
+          <a:off x="0" y="0"/>
+          <a:ext cx="0" cy="0"/>
+          <a:chOff x="0" y="0"/>
+          <a:chExt cx="0" cy="0"/>
+        </a:xfrm>
+      </p:grpSpPr>
+      <p:sp>
+        <p:nvSpPr>
+          <p:cNvPr id="2" name="Title 1">
+            <a:extLst>
+              <a:ext uri="{FF2B5EF4-FFF2-40B4-BE49-F238E27FC236}">
                 <a16:creationId xmlns:a16="http://schemas.microsoft.com/office/drawing/2014/main" id="{80D6B9E9-E589-4099-9F49-1F83C7C68912}"/>
               </a:ext>
             </a:extLst>
@@ -54628,1222 +56193,6 @@
     <p:extLst>
       <p:ext uri="{BB962C8B-B14F-4D97-AF65-F5344CB8AC3E}">
         <p14:creationId xmlns:p14="http://schemas.microsoft.com/office/powerpoint/2010/main" val="4107248312"/>
-      </p:ext>
-    </p:extLst>
-  </p:cSld>
-  <p:clrMapOvr>
-    <a:masterClrMapping/>
-  </p:clrMapOvr>
-</p:sld>
-</file>
-
-<file path=ppt/slides/slide9.xml><?xml version="1.0" encoding="utf-8"?>
-<p:sld xmlns:a="http://schemas.openxmlformats.org/drawingml/2006/main" xmlns:r="http://schemas.openxmlformats.org/officeDocument/2006/relationships" xmlns:p="http://schemas.openxmlformats.org/presentationml/2006/main">
-  <p:cSld>
-    <p:spTree>
-      <p:nvGrpSpPr>
-        <p:cNvPr id="1" name=""/>
-        <p:cNvGrpSpPr/>
-        <p:nvPr/>
-      </p:nvGrpSpPr>
-      <p:grpSpPr>
-        <a:xfrm>
-          <a:off x="0" y="0"/>
-          <a:ext cx="0" cy="0"/>
-          <a:chOff x="0" y="0"/>
-          <a:chExt cx="0" cy="0"/>
-        </a:xfrm>
-      </p:grpSpPr>
-      <p:sp>
-        <p:nvSpPr>
-          <p:cNvPr id="2" name="Title 1">
-            <a:extLst>
-              <a:ext uri="{FF2B5EF4-FFF2-40B4-BE49-F238E27FC236}">
-                <a16:creationId xmlns:a16="http://schemas.microsoft.com/office/drawing/2014/main" id="{E7A8E171-8182-4B83-A134-D8CA3A34DDB2}"/>
-              </a:ext>
-            </a:extLst>
-          </p:cNvPr>
-          <p:cNvSpPr>
-            <a:spLocks noGrp="1"/>
-          </p:cNvSpPr>
-          <p:nvPr>
-            <p:ph type="title"/>
-          </p:nvPr>
-        </p:nvSpPr>
-        <p:spPr/>
-        <p:txBody>
-          <a:bodyPr/>
-          <a:lstStyle/>
-          <a:p>
-            <a:r>
-              <a:rPr lang="en-US" dirty="0"/>
-              <a:t>Azure function 2.0 Architecture</a:t>
-            </a:r>
-          </a:p>
-        </p:txBody>
-      </p:sp>
-      <p:sp>
-        <p:nvSpPr>
-          <p:cNvPr id="4" name="Flowchart: Magnetic Disk 3">
-            <a:extLst>
-              <a:ext uri="{FF2B5EF4-FFF2-40B4-BE49-F238E27FC236}">
-                <a16:creationId xmlns:a16="http://schemas.microsoft.com/office/drawing/2014/main" id="{4AABCAF4-5610-4276-BC62-0156F6A7C980}"/>
-              </a:ext>
-            </a:extLst>
-          </p:cNvPr>
-          <p:cNvSpPr/>
-          <p:nvPr/>
-        </p:nvSpPr>
-        <p:spPr>
-          <a:xfrm>
-            <a:off x="1134679" y="697202"/>
-            <a:ext cx="6905734" cy="3452197"/>
-          </a:xfrm>
-          <a:prstGeom prst="flowChartMagneticDisk">
-            <a:avLst/>
-          </a:prstGeom>
-          <a:solidFill>
-            <a:schemeClr val="tx1"/>
-          </a:solidFill>
-          <a:ln>
-            <a:noFill/>
-          </a:ln>
-          <a:effectLst/>
-        </p:spPr>
-        <p:style>
-          <a:lnRef idx="1">
-            <a:schemeClr val="accent1"/>
-          </a:lnRef>
-          <a:fillRef idx="3">
-            <a:schemeClr val="accent1"/>
-          </a:fillRef>
-          <a:effectRef idx="2">
-            <a:schemeClr val="accent1"/>
-          </a:effectRef>
-          <a:fontRef idx="minor">
-            <a:schemeClr val="lt1"/>
-          </a:fontRef>
-        </p:style>
-        <p:txBody>
-          <a:bodyPr rtlCol="0" anchor="ctr"/>
-          <a:lstStyle/>
-          <a:p>
-            <a:pPr algn="ctr"/>
-            <a:endParaRPr lang="en-US"/>
-          </a:p>
-        </p:txBody>
-      </p:sp>
-      <p:sp>
-        <p:nvSpPr>
-          <p:cNvPr id="6" name="Flowchart: Alternate Process 5">
-            <a:extLst>
-              <a:ext uri="{FF2B5EF4-FFF2-40B4-BE49-F238E27FC236}">
-                <a16:creationId xmlns:a16="http://schemas.microsoft.com/office/drawing/2014/main" id="{B9572589-2E6F-4833-8C66-3C5E568184E4}"/>
-              </a:ext>
-            </a:extLst>
-          </p:cNvPr>
-          <p:cNvSpPr/>
-          <p:nvPr/>
-        </p:nvSpPr>
-        <p:spPr>
-          <a:xfrm>
-            <a:off x="1352369" y="3720671"/>
-            <a:ext cx="6488354" cy="336332"/>
-          </a:xfrm>
-          <a:prstGeom prst="flowChartAlternateProcess">
-            <a:avLst/>
-          </a:prstGeom>
-          <a:solidFill>
-            <a:schemeClr val="tx2">
-              <a:lumMod val="90000"/>
-              <a:lumOff val="10000"/>
-            </a:schemeClr>
-          </a:solidFill>
-          <a:ln>
-            <a:solidFill>
-              <a:schemeClr val="bg1"/>
-            </a:solidFill>
-          </a:ln>
-          <a:effectLst/>
-        </p:spPr>
-        <p:style>
-          <a:lnRef idx="1">
-            <a:schemeClr val="accent1"/>
-          </a:lnRef>
-          <a:fillRef idx="3">
-            <a:schemeClr val="accent1"/>
-          </a:fillRef>
-          <a:effectRef idx="2">
-            <a:schemeClr val="accent1"/>
-          </a:effectRef>
-          <a:fontRef idx="minor">
-            <a:schemeClr val="lt1"/>
-          </a:fontRef>
-        </p:style>
-        <p:txBody>
-          <a:bodyPr rtlCol="0" anchor="ctr"/>
-          <a:lstStyle/>
-          <a:p>
-            <a:pPr algn="ctr"/>
-            <a:r>
-              <a:rPr lang="en-US" dirty="0"/>
-              <a:t>Functions v2 runtime</a:t>
-            </a:r>
-          </a:p>
-        </p:txBody>
-      </p:sp>
-      <p:sp>
-        <p:nvSpPr>
-          <p:cNvPr id="7" name="Flowchart: Alternate Process 6">
-            <a:extLst>
-              <a:ext uri="{FF2B5EF4-FFF2-40B4-BE49-F238E27FC236}">
-                <a16:creationId xmlns:a16="http://schemas.microsoft.com/office/drawing/2014/main" id="{71D5F982-18DB-43A5-A771-DD84600F4E65}"/>
-              </a:ext>
-            </a:extLst>
-          </p:cNvPr>
-          <p:cNvSpPr/>
-          <p:nvPr/>
-        </p:nvSpPr>
-        <p:spPr>
-          <a:xfrm>
-            <a:off x="1152419" y="2634606"/>
-            <a:ext cx="6779172" cy="1086065"/>
-          </a:xfrm>
-          <a:prstGeom prst="flowChartAlternateProcess">
-            <a:avLst/>
-          </a:prstGeom>
-          <a:solidFill>
-            <a:schemeClr val="tx2">
-              <a:lumMod val="75000"/>
-              <a:lumOff val="25000"/>
-            </a:schemeClr>
-          </a:solidFill>
-          <a:ln>
-            <a:solidFill>
-              <a:schemeClr val="bg1"/>
-            </a:solidFill>
-          </a:ln>
-          <a:effectLst/>
-        </p:spPr>
-        <p:style>
-          <a:lnRef idx="1">
-            <a:schemeClr val="accent1"/>
-          </a:lnRef>
-          <a:fillRef idx="3">
-            <a:schemeClr val="accent1"/>
-          </a:fillRef>
-          <a:effectRef idx="2">
-            <a:schemeClr val="accent1"/>
-          </a:effectRef>
-          <a:fontRef idx="minor">
-            <a:schemeClr val="lt1"/>
-          </a:fontRef>
-        </p:style>
-        <p:txBody>
-          <a:bodyPr rtlCol="0" anchor="ctr"/>
-          <a:lstStyle/>
-          <a:p>
-            <a:pPr lvl="8" algn="r"/>
-            <a:endParaRPr lang="en-US" dirty="0"/>
-          </a:p>
-          <a:p>
-            <a:pPr lvl="8" algn="r"/>
-            <a:endParaRPr lang="en-US" dirty="0"/>
-          </a:p>
-          <a:p>
-            <a:pPr lvl="8" algn="r"/>
-            <a:endParaRPr lang="en-US" dirty="0"/>
-          </a:p>
-          <a:p>
-            <a:pPr lvl="8" algn="r"/>
-            <a:r>
-              <a:rPr lang="en-US" dirty="0"/>
-              <a:t>Host process</a:t>
-            </a:r>
-          </a:p>
-        </p:txBody>
-      </p:sp>
-      <p:sp>
-        <p:nvSpPr>
-          <p:cNvPr id="8" name="Flowchart: Alternate Process 7">
-            <a:extLst>
-              <a:ext uri="{FF2B5EF4-FFF2-40B4-BE49-F238E27FC236}">
-                <a16:creationId xmlns:a16="http://schemas.microsoft.com/office/drawing/2014/main" id="{BFEF1D9A-AC40-4988-8D30-B91BA710A316}"/>
-              </a:ext>
-            </a:extLst>
-          </p:cNvPr>
-          <p:cNvSpPr/>
-          <p:nvPr/>
-        </p:nvSpPr>
-        <p:spPr>
-          <a:xfrm>
-            <a:off x="1429411" y="2848312"/>
-            <a:ext cx="6411311" cy="609600"/>
-          </a:xfrm>
-          <a:prstGeom prst="flowChartAlternateProcess">
-            <a:avLst/>
-          </a:prstGeom>
-          <a:solidFill>
-            <a:schemeClr val="tx2">
-              <a:lumMod val="50000"/>
-              <a:lumOff val="50000"/>
-            </a:schemeClr>
-          </a:solidFill>
-          <a:ln>
-            <a:noFill/>
-          </a:ln>
-          <a:effectLst/>
-        </p:spPr>
-        <p:style>
-          <a:lnRef idx="1">
-            <a:schemeClr val="accent1"/>
-          </a:lnRef>
-          <a:fillRef idx="3">
-            <a:schemeClr val="accent1"/>
-          </a:fillRef>
-          <a:effectRef idx="2">
-            <a:schemeClr val="accent1"/>
-          </a:effectRef>
-          <a:fontRef idx="minor">
-            <a:schemeClr val="lt1"/>
-          </a:fontRef>
-        </p:style>
-        <p:txBody>
-          <a:bodyPr rtlCol="0" anchor="ctr"/>
-          <a:lstStyle/>
-          <a:p>
-            <a:pPr algn="r"/>
-            <a:r>
-              <a:rPr lang="en-US" dirty="0"/>
-              <a:t> Host Runtime</a:t>
-            </a:r>
-          </a:p>
-        </p:txBody>
-      </p:sp>
-      <p:sp>
-        <p:nvSpPr>
-          <p:cNvPr id="9" name="Flowchart: Alternate Process 8">
-            <a:extLst>
-              <a:ext uri="{FF2B5EF4-FFF2-40B4-BE49-F238E27FC236}">
-                <a16:creationId xmlns:a16="http://schemas.microsoft.com/office/drawing/2014/main" id="{DB641EE8-C356-4C87-8E58-F42A88EAF273}"/>
-              </a:ext>
-            </a:extLst>
-          </p:cNvPr>
-          <p:cNvSpPr/>
-          <p:nvPr/>
-        </p:nvSpPr>
-        <p:spPr>
-          <a:xfrm>
-            <a:off x="1576556" y="2895258"/>
-            <a:ext cx="1313793" cy="562654"/>
-          </a:xfrm>
-          <a:prstGeom prst="flowChartAlternateProcess">
-            <a:avLst/>
-          </a:prstGeom>
-          <a:solidFill>
-            <a:schemeClr val="tx1">
-              <a:lumMod val="50000"/>
-            </a:schemeClr>
-          </a:solidFill>
-          <a:ln>
-            <a:noFill/>
-          </a:ln>
-          <a:effectLst/>
-        </p:spPr>
-        <p:style>
-          <a:lnRef idx="1">
-            <a:schemeClr val="accent1"/>
-          </a:lnRef>
-          <a:fillRef idx="3">
-            <a:schemeClr val="accent1"/>
-          </a:fillRef>
-          <a:effectRef idx="2">
-            <a:schemeClr val="accent1"/>
-          </a:effectRef>
-          <a:fontRef idx="minor">
-            <a:schemeClr val="lt1"/>
-          </a:fontRef>
-        </p:style>
-        <p:txBody>
-          <a:bodyPr rtlCol="0" anchor="ctr"/>
-          <a:lstStyle/>
-          <a:p>
-            <a:pPr algn="ctr"/>
-            <a:r>
-              <a:rPr lang="en-US" dirty="0"/>
-              <a:t>.NET </a:t>
-            </a:r>
-          </a:p>
-          <a:p>
-            <a:pPr algn="ctr"/>
-            <a:r>
-              <a:rPr lang="en-US" dirty="0"/>
-              <a:t>(v1)</a:t>
-            </a:r>
-          </a:p>
-        </p:txBody>
-      </p:sp>
-      <p:sp>
-        <p:nvSpPr>
-          <p:cNvPr id="10" name="Flowchart: Alternate Process 9">
-            <a:extLst>
-              <a:ext uri="{FF2B5EF4-FFF2-40B4-BE49-F238E27FC236}">
-                <a16:creationId xmlns:a16="http://schemas.microsoft.com/office/drawing/2014/main" id="{0A0A4433-2F8D-401B-A001-910FB85B6A57}"/>
-              </a:ext>
-            </a:extLst>
-          </p:cNvPr>
-          <p:cNvSpPr/>
-          <p:nvPr/>
-        </p:nvSpPr>
-        <p:spPr>
-          <a:xfrm>
-            <a:off x="3275945" y="2895258"/>
-            <a:ext cx="1474731" cy="515829"/>
-          </a:xfrm>
-          <a:prstGeom prst="flowChartAlternateProcess">
-            <a:avLst/>
-          </a:prstGeom>
-          <a:solidFill>
-            <a:schemeClr val="tx1">
-              <a:lumMod val="50000"/>
-            </a:schemeClr>
-          </a:solidFill>
-          <a:ln>
-            <a:noFill/>
-          </a:ln>
-          <a:effectLst/>
-        </p:spPr>
-        <p:style>
-          <a:lnRef idx="1">
-            <a:schemeClr val="accent1"/>
-          </a:lnRef>
-          <a:fillRef idx="3">
-            <a:schemeClr val="accent1"/>
-          </a:fillRef>
-          <a:effectRef idx="2">
-            <a:schemeClr val="accent1"/>
-          </a:effectRef>
-          <a:fontRef idx="minor">
-            <a:schemeClr val="lt1"/>
-          </a:fontRef>
-        </p:style>
-        <p:txBody>
-          <a:bodyPr rtlCol="0" anchor="ctr"/>
-          <a:lstStyle/>
-          <a:p>
-            <a:pPr algn="ctr"/>
-            <a:r>
-              <a:rPr lang="en-US" dirty="0"/>
-              <a:t>.NET Core</a:t>
-            </a:r>
-          </a:p>
-          <a:p>
-            <a:pPr algn="ctr"/>
-            <a:r>
-              <a:rPr lang="en-US" dirty="0"/>
-              <a:t>(V2)</a:t>
-            </a:r>
-          </a:p>
-        </p:txBody>
-      </p:sp>
-      <p:sp>
-        <p:nvSpPr>
-          <p:cNvPr id="11" name="Flowchart: Alternate Process 10">
-            <a:extLst>
-              <a:ext uri="{FF2B5EF4-FFF2-40B4-BE49-F238E27FC236}">
-                <a16:creationId xmlns:a16="http://schemas.microsoft.com/office/drawing/2014/main" id="{63C57E02-2DE0-4FA6-8FFF-219E4D050910}"/>
-              </a:ext>
-            </a:extLst>
-          </p:cNvPr>
-          <p:cNvSpPr/>
-          <p:nvPr/>
-        </p:nvSpPr>
-        <p:spPr>
-          <a:xfrm>
-            <a:off x="1152419" y="1250731"/>
-            <a:ext cx="6887994" cy="1258163"/>
-          </a:xfrm>
-          <a:prstGeom prst="flowChartAlternateProcess">
-            <a:avLst/>
-          </a:prstGeom>
-          <a:solidFill>
-            <a:schemeClr val="bg2">
-              <a:lumMod val="50000"/>
-            </a:schemeClr>
-          </a:solidFill>
-          <a:ln>
-            <a:solidFill>
-              <a:schemeClr val="bg1"/>
-            </a:solidFill>
-          </a:ln>
-          <a:effectLst/>
-        </p:spPr>
-        <p:style>
-          <a:lnRef idx="1">
-            <a:schemeClr val="accent1"/>
-          </a:lnRef>
-          <a:fillRef idx="3">
-            <a:schemeClr val="accent1"/>
-          </a:fillRef>
-          <a:effectRef idx="2">
-            <a:schemeClr val="accent1"/>
-          </a:effectRef>
-          <a:fontRef idx="minor">
-            <a:schemeClr val="lt1"/>
-          </a:fontRef>
-        </p:style>
-        <p:txBody>
-          <a:bodyPr rtlCol="0" anchor="ctr"/>
-          <a:lstStyle/>
-          <a:p>
-            <a:pPr algn="r"/>
-            <a:endParaRPr lang="en-US" dirty="0"/>
-          </a:p>
-          <a:p>
-            <a:pPr algn="r"/>
-            <a:endParaRPr lang="en-US" dirty="0"/>
-          </a:p>
-          <a:p>
-            <a:pPr algn="r"/>
-            <a:endParaRPr lang="en-US" dirty="0"/>
-          </a:p>
-          <a:p>
-            <a:pPr lvl="1" algn="r"/>
-            <a:r>
-              <a:rPr lang="en-US" dirty="0"/>
-              <a:t>	  Language Worker</a:t>
-            </a:r>
-          </a:p>
-        </p:txBody>
-      </p:sp>
-      <p:sp>
-        <p:nvSpPr>
-          <p:cNvPr id="12" name="Flowchart: Alternate Process 11">
-            <a:extLst>
-              <a:ext uri="{FF2B5EF4-FFF2-40B4-BE49-F238E27FC236}">
-                <a16:creationId xmlns:a16="http://schemas.microsoft.com/office/drawing/2014/main" id="{CFFE734D-19B3-4BCA-8317-D280770A3965}"/>
-              </a:ext>
-            </a:extLst>
-          </p:cNvPr>
-          <p:cNvSpPr/>
-          <p:nvPr/>
-        </p:nvSpPr>
-        <p:spPr>
-          <a:xfrm>
-            <a:off x="1229708" y="1359768"/>
-            <a:ext cx="6701883" cy="759841"/>
-          </a:xfrm>
-          <a:prstGeom prst="flowChartAlternateProcess">
-            <a:avLst/>
-          </a:prstGeom>
-          <a:solidFill>
-            <a:schemeClr val="bg2">
-              <a:lumMod val="65000"/>
-            </a:schemeClr>
-          </a:solidFill>
-          <a:ln>
-            <a:solidFill>
-              <a:schemeClr val="accent2">
-                <a:lumMod val="50000"/>
-              </a:schemeClr>
-            </a:solidFill>
-          </a:ln>
-          <a:effectLst/>
-        </p:spPr>
-        <p:style>
-          <a:lnRef idx="1">
-            <a:schemeClr val="accent1"/>
-          </a:lnRef>
-          <a:fillRef idx="3">
-            <a:schemeClr val="accent1"/>
-          </a:fillRef>
-          <a:effectRef idx="2">
-            <a:schemeClr val="accent1"/>
-          </a:effectRef>
-          <a:fontRef idx="minor">
-            <a:schemeClr val="lt1"/>
-          </a:fontRef>
-        </p:style>
-        <p:txBody>
-          <a:bodyPr rtlCol="0" anchor="ctr"/>
-          <a:lstStyle/>
-          <a:p>
-            <a:pPr lvl="8" algn="ctr"/>
-            <a:endParaRPr lang="en-US" dirty="0"/>
-          </a:p>
-          <a:p>
-            <a:pPr lvl="8" algn="ctr"/>
-            <a:r>
-              <a:rPr lang="en-US" dirty="0"/>
-              <a:t>	              Function code</a:t>
-            </a:r>
-          </a:p>
-        </p:txBody>
-      </p:sp>
-      <p:sp>
-        <p:nvSpPr>
-          <p:cNvPr id="16" name="Flowchart: Alternate Process 15">
-            <a:extLst>
-              <a:ext uri="{FF2B5EF4-FFF2-40B4-BE49-F238E27FC236}">
-                <a16:creationId xmlns:a16="http://schemas.microsoft.com/office/drawing/2014/main" id="{92380E7F-DE68-4623-AEA9-4C8ACAB8E48E}"/>
-              </a:ext>
-            </a:extLst>
-          </p:cNvPr>
-          <p:cNvSpPr/>
-          <p:nvPr/>
-        </p:nvSpPr>
-        <p:spPr>
-          <a:xfrm>
-            <a:off x="4894219" y="1392847"/>
-            <a:ext cx="1359444" cy="346842"/>
-          </a:xfrm>
-          <a:prstGeom prst="flowChartAlternateProcess">
-            <a:avLst/>
-          </a:prstGeom>
-          <a:solidFill>
-            <a:schemeClr val="accent4">
-              <a:lumMod val="50000"/>
-            </a:schemeClr>
-          </a:solidFill>
-          <a:ln>
-            <a:noFill/>
-          </a:ln>
-          <a:effectLst/>
-        </p:spPr>
-        <p:style>
-          <a:lnRef idx="1">
-            <a:schemeClr val="accent1"/>
-          </a:lnRef>
-          <a:fillRef idx="3">
-            <a:schemeClr val="accent1"/>
-          </a:fillRef>
-          <a:effectRef idx="2">
-            <a:schemeClr val="accent1"/>
-          </a:effectRef>
-          <a:fontRef idx="minor">
-            <a:schemeClr val="lt1"/>
-          </a:fontRef>
-        </p:style>
-        <p:txBody>
-          <a:bodyPr rtlCol="0" anchor="ctr"/>
-          <a:lstStyle/>
-          <a:p>
-            <a:pPr algn="ctr"/>
-            <a:r>
-              <a:rPr lang="en-US" dirty="0"/>
-              <a:t>.NET core</a:t>
-            </a:r>
-          </a:p>
-        </p:txBody>
-      </p:sp>
-      <p:sp>
-        <p:nvSpPr>
-          <p:cNvPr id="18" name="Arrow: Down 17">
-            <a:extLst>
-              <a:ext uri="{FF2B5EF4-FFF2-40B4-BE49-F238E27FC236}">
-                <a16:creationId xmlns:a16="http://schemas.microsoft.com/office/drawing/2014/main" id="{71434F70-AAE0-4E68-9B2F-E84FA98F8497}"/>
-              </a:ext>
-            </a:extLst>
-          </p:cNvPr>
-          <p:cNvSpPr/>
-          <p:nvPr/>
-        </p:nvSpPr>
-        <p:spPr>
-          <a:xfrm>
-            <a:off x="5304118" y="1739689"/>
-            <a:ext cx="497930" cy="1131841"/>
-          </a:xfrm>
-          <a:prstGeom prst="downArrow">
-            <a:avLst/>
-          </a:prstGeom>
-          <a:solidFill>
-            <a:schemeClr val="accent3">
-              <a:lumMod val="50000"/>
-            </a:schemeClr>
-          </a:solidFill>
-          <a:ln>
-            <a:noFill/>
-          </a:ln>
-          <a:effectLst/>
-        </p:spPr>
-        <p:style>
-          <a:lnRef idx="1">
-            <a:schemeClr val="accent1"/>
-          </a:lnRef>
-          <a:fillRef idx="3">
-            <a:schemeClr val="accent1"/>
-          </a:fillRef>
-          <a:effectRef idx="2">
-            <a:schemeClr val="accent1"/>
-          </a:effectRef>
-          <a:fontRef idx="minor">
-            <a:schemeClr val="lt1"/>
-          </a:fontRef>
-        </p:style>
-        <p:txBody>
-          <a:bodyPr rot="0" spcFirstLastPara="0" vertOverflow="overflow" horzOverflow="overflow" vert="horz" wrap="square" lIns="91440" tIns="45720" rIns="91440" bIns="45720" numCol="1" spcCol="0" rtlCol="0" fromWordArt="0" anchor="ctr" anchorCtr="0" forceAA="0" compatLnSpc="1">
-            <a:prstTxWarp prst="textNoShape">
-              <a:avLst/>
-            </a:prstTxWarp>
-            <a:noAutofit/>
-          </a:bodyPr>
-          <a:lstStyle/>
-          <a:p>
-            <a:pPr algn="ctr"/>
-            <a:endParaRPr lang="en-US"/>
-          </a:p>
-        </p:txBody>
-      </p:sp>
-      <p:sp>
-        <p:nvSpPr>
-          <p:cNvPr id="19" name="Arrow: Down 18">
-            <a:extLst>
-              <a:ext uri="{FF2B5EF4-FFF2-40B4-BE49-F238E27FC236}">
-                <a16:creationId xmlns:a16="http://schemas.microsoft.com/office/drawing/2014/main" id="{6AD35324-9637-4695-B0BC-8256C82378D6}"/>
-              </a:ext>
-            </a:extLst>
-          </p:cNvPr>
-          <p:cNvSpPr/>
-          <p:nvPr/>
-        </p:nvSpPr>
-        <p:spPr>
-          <a:xfrm>
-            <a:off x="2897363" y="1751750"/>
-            <a:ext cx="497930" cy="1119780"/>
-          </a:xfrm>
-          <a:prstGeom prst="downArrow">
-            <a:avLst/>
-          </a:prstGeom>
-          <a:solidFill>
-            <a:schemeClr val="accent3">
-              <a:lumMod val="50000"/>
-            </a:schemeClr>
-          </a:solidFill>
-          <a:ln>
-            <a:noFill/>
-          </a:ln>
-          <a:effectLst/>
-        </p:spPr>
-        <p:style>
-          <a:lnRef idx="1">
-            <a:schemeClr val="accent1"/>
-          </a:lnRef>
-          <a:fillRef idx="3">
-            <a:schemeClr val="accent1"/>
-          </a:fillRef>
-          <a:effectRef idx="2">
-            <a:schemeClr val="accent1"/>
-          </a:effectRef>
-          <a:fontRef idx="minor">
-            <a:schemeClr val="lt1"/>
-          </a:fontRef>
-        </p:style>
-        <p:txBody>
-          <a:bodyPr rot="0" spcFirstLastPara="0" vertOverflow="overflow" horzOverflow="overflow" vert="horz" wrap="square" lIns="91440" tIns="45720" rIns="91440" bIns="45720" numCol="1" spcCol="0" rtlCol="0" fromWordArt="0" anchor="ctr" anchorCtr="0" forceAA="0" compatLnSpc="1">
-            <a:prstTxWarp prst="textNoShape">
-              <a:avLst/>
-            </a:prstTxWarp>
-            <a:noAutofit/>
-          </a:bodyPr>
-          <a:lstStyle/>
-          <a:p>
-            <a:pPr algn="ctr"/>
-            <a:endParaRPr lang="en-US"/>
-          </a:p>
-        </p:txBody>
-      </p:sp>
-      <p:sp>
-        <p:nvSpPr>
-          <p:cNvPr id="20" name="Arrow: Down 19">
-            <a:extLst>
-              <a:ext uri="{FF2B5EF4-FFF2-40B4-BE49-F238E27FC236}">
-                <a16:creationId xmlns:a16="http://schemas.microsoft.com/office/drawing/2014/main" id="{11D12455-AD5C-4445-BDEA-F806B4656CCE}"/>
-              </a:ext>
-            </a:extLst>
-          </p:cNvPr>
-          <p:cNvSpPr/>
-          <p:nvPr/>
-        </p:nvSpPr>
-        <p:spPr>
-          <a:xfrm>
-            <a:off x="4089616" y="1739689"/>
-            <a:ext cx="497930" cy="1092857"/>
-          </a:xfrm>
-          <a:prstGeom prst="downArrow">
-            <a:avLst/>
-          </a:prstGeom>
-          <a:solidFill>
-            <a:schemeClr val="accent3">
-              <a:lumMod val="50000"/>
-            </a:schemeClr>
-          </a:solidFill>
-          <a:ln>
-            <a:noFill/>
-          </a:ln>
-          <a:effectLst/>
-        </p:spPr>
-        <p:style>
-          <a:lnRef idx="1">
-            <a:schemeClr val="accent1"/>
-          </a:lnRef>
-          <a:fillRef idx="3">
-            <a:schemeClr val="accent1"/>
-          </a:fillRef>
-          <a:effectRef idx="2">
-            <a:schemeClr val="accent1"/>
-          </a:effectRef>
-          <a:fontRef idx="minor">
-            <a:schemeClr val="lt1"/>
-          </a:fontRef>
-        </p:style>
-        <p:txBody>
-          <a:bodyPr rot="0" spcFirstLastPara="0" vertOverflow="overflow" horzOverflow="overflow" vert="horz" wrap="square" lIns="91440" tIns="45720" rIns="91440" bIns="45720" numCol="1" spcCol="0" rtlCol="0" fromWordArt="0" anchor="ctr" anchorCtr="0" forceAA="0" compatLnSpc="1">
-            <a:prstTxWarp prst="textNoShape">
-              <a:avLst/>
-            </a:prstTxWarp>
-            <a:noAutofit/>
-          </a:bodyPr>
-          <a:lstStyle/>
-          <a:p>
-            <a:pPr algn="ctr"/>
-            <a:endParaRPr lang="en-US"/>
-          </a:p>
-        </p:txBody>
-      </p:sp>
-      <p:sp>
-        <p:nvSpPr>
-          <p:cNvPr id="21" name="Arrow: Down 20">
-            <a:extLst>
-              <a:ext uri="{FF2B5EF4-FFF2-40B4-BE49-F238E27FC236}">
-                <a16:creationId xmlns:a16="http://schemas.microsoft.com/office/drawing/2014/main" id="{D38386CF-E9DF-49A6-A4C3-D60EE62BFD13}"/>
-              </a:ext>
-            </a:extLst>
-          </p:cNvPr>
-          <p:cNvSpPr/>
-          <p:nvPr/>
-        </p:nvSpPr>
-        <p:spPr>
-          <a:xfrm>
-            <a:off x="1688450" y="1754706"/>
-            <a:ext cx="497930" cy="1074003"/>
-          </a:xfrm>
-          <a:prstGeom prst="downArrow">
-            <a:avLst/>
-          </a:prstGeom>
-          <a:solidFill>
-            <a:schemeClr val="accent3">
-              <a:lumMod val="50000"/>
-            </a:schemeClr>
-          </a:solidFill>
-          <a:ln>
-            <a:noFill/>
-          </a:ln>
-          <a:effectLst/>
-        </p:spPr>
-        <p:style>
-          <a:lnRef idx="1">
-            <a:schemeClr val="accent1"/>
-          </a:lnRef>
-          <a:fillRef idx="3">
-            <a:schemeClr val="accent1"/>
-          </a:fillRef>
-          <a:effectRef idx="2">
-            <a:schemeClr val="accent1"/>
-          </a:effectRef>
-          <a:fontRef idx="minor">
-            <a:schemeClr val="lt1"/>
-          </a:fontRef>
-        </p:style>
-        <p:txBody>
-          <a:bodyPr rtlCol="0" anchor="ctr"/>
-          <a:lstStyle/>
-          <a:p>
-            <a:pPr algn="ctr"/>
-            <a:endParaRPr lang="en-US"/>
-          </a:p>
-        </p:txBody>
-      </p:sp>
-      <p:sp>
-        <p:nvSpPr>
-          <p:cNvPr id="22" name="Flowchart: Alternate Process 21">
-            <a:extLst>
-              <a:ext uri="{FF2B5EF4-FFF2-40B4-BE49-F238E27FC236}">
-                <a16:creationId xmlns:a16="http://schemas.microsoft.com/office/drawing/2014/main" id="{BDFA0441-02F7-46B6-8FF5-78AB628A95F8}"/>
-              </a:ext>
-            </a:extLst>
-          </p:cNvPr>
-          <p:cNvSpPr/>
-          <p:nvPr/>
-        </p:nvSpPr>
-        <p:spPr>
-          <a:xfrm>
-            <a:off x="1357819" y="1392847"/>
-            <a:ext cx="1072054" cy="346842"/>
-          </a:xfrm>
-          <a:prstGeom prst="flowChartAlternateProcess">
-            <a:avLst/>
-          </a:prstGeom>
-          <a:solidFill>
-            <a:schemeClr val="accent4">
-              <a:lumMod val="50000"/>
-            </a:schemeClr>
-          </a:solidFill>
-          <a:ln>
-            <a:noFill/>
-          </a:ln>
-          <a:effectLst/>
-        </p:spPr>
-        <p:style>
-          <a:lnRef idx="1">
-            <a:schemeClr val="accent1"/>
-          </a:lnRef>
-          <a:fillRef idx="3">
-            <a:schemeClr val="accent1"/>
-          </a:fillRef>
-          <a:effectRef idx="2">
-            <a:schemeClr val="accent1"/>
-          </a:effectRef>
-          <a:fontRef idx="minor">
-            <a:schemeClr val="lt1"/>
-          </a:fontRef>
-        </p:style>
-        <p:txBody>
-          <a:bodyPr rtlCol="0" anchor="ctr"/>
-          <a:lstStyle/>
-          <a:p>
-            <a:pPr algn="ctr"/>
-            <a:r>
-              <a:rPr lang="en-US" dirty="0"/>
-              <a:t>Node. </a:t>
-            </a:r>
-            <a:r>
-              <a:rPr lang="en-US" dirty="0" err="1"/>
-              <a:t>js</a:t>
-            </a:r>
-            <a:endParaRPr lang="en-US" dirty="0"/>
-          </a:p>
-        </p:txBody>
-      </p:sp>
-      <p:sp>
-        <p:nvSpPr>
-          <p:cNvPr id="23" name="Flowchart: Alternate Process 22">
-            <a:extLst>
-              <a:ext uri="{FF2B5EF4-FFF2-40B4-BE49-F238E27FC236}">
-                <a16:creationId xmlns:a16="http://schemas.microsoft.com/office/drawing/2014/main" id="{74CC53E7-8DF7-4F3E-B896-2AC2F70DB939}"/>
-              </a:ext>
-            </a:extLst>
-          </p:cNvPr>
-          <p:cNvSpPr/>
-          <p:nvPr/>
-        </p:nvSpPr>
-        <p:spPr>
-          <a:xfrm>
-            <a:off x="2553865" y="1404909"/>
-            <a:ext cx="1072054" cy="346842"/>
-          </a:xfrm>
-          <a:prstGeom prst="flowChartAlternateProcess">
-            <a:avLst/>
-          </a:prstGeom>
-          <a:solidFill>
-            <a:schemeClr val="accent4">
-              <a:lumMod val="50000"/>
-            </a:schemeClr>
-          </a:solidFill>
-          <a:ln>
-            <a:noFill/>
-          </a:ln>
-          <a:effectLst/>
-        </p:spPr>
-        <p:style>
-          <a:lnRef idx="1">
-            <a:schemeClr val="accent1"/>
-          </a:lnRef>
-          <a:fillRef idx="3">
-            <a:schemeClr val="accent1"/>
-          </a:fillRef>
-          <a:effectRef idx="2">
-            <a:schemeClr val="accent1"/>
-          </a:effectRef>
-          <a:fontRef idx="minor">
-            <a:schemeClr val="lt1"/>
-          </a:fontRef>
-        </p:style>
-        <p:txBody>
-          <a:bodyPr rtlCol="0" anchor="ctr"/>
-          <a:lstStyle/>
-          <a:p>
-            <a:pPr algn="ctr"/>
-            <a:r>
-              <a:rPr lang="en-US" dirty="0"/>
-              <a:t>Java</a:t>
-            </a:r>
-          </a:p>
-        </p:txBody>
-      </p:sp>
-      <p:sp>
-        <p:nvSpPr>
-          <p:cNvPr id="24" name="Flowchart: Alternate Process 23">
-            <a:extLst>
-              <a:ext uri="{FF2B5EF4-FFF2-40B4-BE49-F238E27FC236}">
-                <a16:creationId xmlns:a16="http://schemas.microsoft.com/office/drawing/2014/main" id="{B22A28AB-4891-4655-9B85-BC0247D9DE71}"/>
-              </a:ext>
-            </a:extLst>
-          </p:cNvPr>
-          <p:cNvSpPr/>
-          <p:nvPr/>
-        </p:nvSpPr>
-        <p:spPr>
-          <a:xfrm>
-            <a:off x="3756476" y="1392847"/>
-            <a:ext cx="1072054" cy="346842"/>
-          </a:xfrm>
-          <a:prstGeom prst="flowChartAlternateProcess">
-            <a:avLst/>
-          </a:prstGeom>
-          <a:solidFill>
-            <a:schemeClr val="accent4">
-              <a:lumMod val="50000"/>
-            </a:schemeClr>
-          </a:solidFill>
-          <a:ln>
-            <a:noFill/>
-          </a:ln>
-          <a:effectLst/>
-        </p:spPr>
-        <p:style>
-          <a:lnRef idx="1">
-            <a:schemeClr val="accent1"/>
-          </a:lnRef>
-          <a:fillRef idx="3">
-            <a:schemeClr val="accent1"/>
-          </a:fillRef>
-          <a:effectRef idx="2">
-            <a:schemeClr val="accent1"/>
-          </a:effectRef>
-          <a:fontRef idx="minor">
-            <a:schemeClr val="lt1"/>
-          </a:fontRef>
-        </p:style>
-        <p:txBody>
-          <a:bodyPr rtlCol="0" anchor="ctr"/>
-          <a:lstStyle/>
-          <a:p>
-            <a:pPr algn="ctr"/>
-            <a:r>
-              <a:rPr lang="en-US" dirty="0"/>
-              <a:t>Python</a:t>
-            </a:r>
-          </a:p>
-        </p:txBody>
-      </p:sp>
-      <p:pic>
-        <p:nvPicPr>
-          <p:cNvPr id="35" name="Picture 34">
-            <a:extLst>
-              <a:ext uri="{FF2B5EF4-FFF2-40B4-BE49-F238E27FC236}">
-                <a16:creationId xmlns:a16="http://schemas.microsoft.com/office/drawing/2014/main" id="{C533E835-8253-427A-A099-0CC60765E004}"/>
-              </a:ext>
-            </a:extLst>
-          </p:cNvPr>
-          <p:cNvPicPr>
-            <a:picLocks noChangeAspect="1"/>
-          </p:cNvPicPr>
-          <p:nvPr/>
-        </p:nvPicPr>
-        <p:blipFill>
-          <a:blip r:embed="rId2">
-            <a:extLst>
-              <a:ext uri="{28A0092B-C50C-407E-A947-70E740481C1C}">
-                <a14:useLocalDpi xmlns:a14="http://schemas.microsoft.com/office/drawing/2010/main" val="0"/>
-              </a:ext>
-            </a:extLst>
-          </a:blip>
-          <a:stretch>
-            <a:fillRect/>
-          </a:stretch>
-        </p:blipFill>
-        <p:spPr>
-          <a:xfrm>
-            <a:off x="4600891" y="3985142"/>
-            <a:ext cx="1740428" cy="755925"/>
-          </a:xfrm>
-          <a:prstGeom prst="rect">
-            <a:avLst/>
-          </a:prstGeom>
-        </p:spPr>
-      </p:pic>
-      <p:pic>
-        <p:nvPicPr>
-          <p:cNvPr id="39" name="Picture 38" descr="A close up of a logo&#10;&#10;Description automatically generated">
-            <a:extLst>
-              <a:ext uri="{FF2B5EF4-FFF2-40B4-BE49-F238E27FC236}">
-                <a16:creationId xmlns:a16="http://schemas.microsoft.com/office/drawing/2014/main" id="{B77D1F60-CD89-4E93-B125-CEEB6ADD57A6}"/>
-              </a:ext>
-            </a:extLst>
-          </p:cNvPr>
-          <p:cNvPicPr>
-            <a:picLocks noChangeAspect="1"/>
-          </p:cNvPicPr>
-          <p:nvPr/>
-        </p:nvPicPr>
-        <p:blipFill>
-          <a:blip r:embed="rId3">
-            <a:extLst>
-              <a:ext uri="{28A0092B-C50C-407E-A947-70E740481C1C}">
-                <a14:useLocalDpi xmlns:a14="http://schemas.microsoft.com/office/drawing/2010/main" val="0"/>
-              </a:ext>
-            </a:extLst>
-          </a:blip>
-          <a:stretch>
-            <a:fillRect/>
-          </a:stretch>
-        </p:blipFill>
-        <p:spPr>
-          <a:xfrm>
-            <a:off x="6432187" y="4030255"/>
-            <a:ext cx="1359444" cy="709100"/>
-          </a:xfrm>
-          <a:prstGeom prst="rect">
-            <a:avLst/>
-          </a:prstGeom>
-        </p:spPr>
-      </p:pic>
-      <p:sp>
-        <p:nvSpPr>
-          <p:cNvPr id="40" name="Flowchart: Alternate Process 39">
-            <a:extLst>
-              <a:ext uri="{FF2B5EF4-FFF2-40B4-BE49-F238E27FC236}">
-                <a16:creationId xmlns:a16="http://schemas.microsoft.com/office/drawing/2014/main" id="{C021FB63-330E-4380-BB7E-8871818BCA87}"/>
-              </a:ext>
-            </a:extLst>
-          </p:cNvPr>
-          <p:cNvSpPr/>
-          <p:nvPr/>
-        </p:nvSpPr>
-        <p:spPr>
-          <a:xfrm>
-            <a:off x="1292779" y="4123552"/>
-            <a:ext cx="1390132" cy="579376"/>
-          </a:xfrm>
-          <a:prstGeom prst="flowChartAlternateProcess">
-            <a:avLst/>
-          </a:prstGeom>
-          <a:solidFill>
-            <a:schemeClr val="bg1">
-              <a:lumMod val="85000"/>
-            </a:schemeClr>
-          </a:solidFill>
-          <a:ln>
-            <a:noFill/>
-          </a:ln>
-          <a:effectLst/>
-        </p:spPr>
-        <p:style>
-          <a:lnRef idx="1">
-            <a:schemeClr val="accent1"/>
-          </a:lnRef>
-          <a:fillRef idx="3">
-            <a:schemeClr val="accent1"/>
-          </a:fillRef>
-          <a:effectRef idx="2">
-            <a:schemeClr val="accent1"/>
-          </a:effectRef>
-          <a:fontRef idx="minor">
-            <a:schemeClr val="lt1"/>
-          </a:fontRef>
-        </p:style>
-        <p:txBody>
-          <a:bodyPr rtlCol="0" anchor="ctr"/>
-          <a:lstStyle/>
-          <a:p>
-            <a:pPr algn="ctr"/>
-            <a:r>
-              <a:rPr lang="en-US" dirty="0">
-                <a:solidFill>
-                  <a:schemeClr val="tx2"/>
-                </a:solidFill>
-              </a:rPr>
-              <a:t>MAC</a:t>
-            </a:r>
-          </a:p>
-        </p:txBody>
-      </p:sp>
-      <p:pic>
-        <p:nvPicPr>
-          <p:cNvPr id="5" name="Picture 4">
-            <a:extLst>
-              <a:ext uri="{FF2B5EF4-FFF2-40B4-BE49-F238E27FC236}">
-                <a16:creationId xmlns:a16="http://schemas.microsoft.com/office/drawing/2014/main" id="{287A9EDA-2F5E-4792-851A-7BF4F358E74A}"/>
-              </a:ext>
-            </a:extLst>
-          </p:cNvPr>
-          <p:cNvPicPr>
-            <a:picLocks noChangeAspect="1"/>
-          </p:cNvPicPr>
-          <p:nvPr/>
-        </p:nvPicPr>
-        <p:blipFill>
-          <a:blip r:embed="rId4" cstate="print">
-            <a:extLst>
-              <a:ext uri="{28A0092B-C50C-407E-A947-70E740481C1C}">
-                <a14:useLocalDpi xmlns:a14="http://schemas.microsoft.com/office/drawing/2010/main" val="0"/>
-              </a:ext>
-            </a:extLst>
-          </a:blip>
-          <a:stretch>
-            <a:fillRect/>
-          </a:stretch>
-        </p:blipFill>
-        <p:spPr>
-          <a:xfrm>
-            <a:off x="2897363" y="4130413"/>
-            <a:ext cx="859113" cy="557105"/>
-          </a:xfrm>
-          <a:prstGeom prst="rect">
-            <a:avLst/>
-          </a:prstGeom>
-        </p:spPr>
-      </p:pic>
-      <p:pic>
-        <p:nvPicPr>
-          <p:cNvPr id="14" name="Picture 13">
-            <a:extLst>
-              <a:ext uri="{FF2B5EF4-FFF2-40B4-BE49-F238E27FC236}">
-                <a16:creationId xmlns:a16="http://schemas.microsoft.com/office/drawing/2014/main" id="{808FB694-649E-4F34-9EFB-A51727ECA016}"/>
-              </a:ext>
-            </a:extLst>
-          </p:cNvPr>
-          <p:cNvPicPr>
-            <a:picLocks noChangeAspect="1"/>
-          </p:cNvPicPr>
-          <p:nvPr/>
-        </p:nvPicPr>
-        <p:blipFill>
-          <a:blip r:embed="rId5">
-            <a:extLst>
-              <a:ext uri="{28A0092B-C50C-407E-A947-70E740481C1C}">
-                <a14:useLocalDpi xmlns:a14="http://schemas.microsoft.com/office/drawing/2010/main" val="0"/>
-              </a:ext>
-            </a:extLst>
-          </a:blip>
-          <a:stretch>
-            <a:fillRect/>
-          </a:stretch>
-        </p:blipFill>
-        <p:spPr>
-          <a:xfrm>
-            <a:off x="3847345" y="4123553"/>
-            <a:ext cx="859114" cy="557106"/>
-          </a:xfrm>
-          <a:prstGeom prst="rect">
-            <a:avLst/>
-          </a:prstGeom>
-        </p:spPr>
-      </p:pic>
-    </p:spTree>
-    <p:extLst>
-      <p:ext uri="{BB962C8B-B14F-4D97-AF65-F5344CB8AC3E}">
-        <p14:creationId xmlns:p14="http://schemas.microsoft.com/office/powerpoint/2010/main" val="1654665863"/>
       </p:ext>
     </p:extLst>
   </p:cSld>

</xml_diff>